<commit_message>
reviewing first 10 questions of the test
</commit_message>
<xml_diff>
--- a/AZ-900/Practice-Test2.pptx
+++ b/AZ-900/Practice-Test2.pptx
@@ -6,6 +6,17 @@
   </p:sldMasterIdLst>
   <p:sldIdLst>
     <p:sldId id="256" r:id="rId2"/>
+    <p:sldId id="257" r:id="rId3"/>
+    <p:sldId id="258" r:id="rId4"/>
+    <p:sldId id="259" r:id="rId5"/>
+    <p:sldId id="260" r:id="rId6"/>
+    <p:sldId id="261" r:id="rId7"/>
+    <p:sldId id="262" r:id="rId8"/>
+    <p:sldId id="263" r:id="rId9"/>
+    <p:sldId id="264" r:id="rId10"/>
+    <p:sldId id="265" r:id="rId11"/>
+    <p:sldId id="266" r:id="rId12"/>
+    <p:sldId id="267" r:id="rId13"/>
   </p:sldIdLst>
   <p:sldSz cx="12192000" cy="6858000"/>
   <p:notesSz cx="6858000" cy="9144000"/>
@@ -104,6 +115,11 @@
       </a:defRPr>
     </a:lvl9pPr>
   </p:defaultTextStyle>
+  <p:extLst>
+    <p:ext uri="{EFAFB233-063F-42B5-8137-9DF3F51BA10A}">
+      <p15:sldGuideLst xmlns:p15="http://schemas.microsoft.com/office/powerpoint/2012/main"/>
+    </p:ext>
+  </p:extLst>
 </p:presentation>
 </file>
 
@@ -3001,6 +3017,600 @@
 </p:sld>
 </file>
 
+<file path=ppt/slides/slide10.xml><?xml version="1.0" encoding="utf-8"?>
+<p:sld xmlns:a="http://schemas.openxmlformats.org/drawingml/2006/main" xmlns:r="http://schemas.openxmlformats.org/officeDocument/2006/relationships" xmlns:p="http://schemas.openxmlformats.org/presentationml/2006/main">
+  <p:cSld>
+    <p:spTree>
+      <p:nvGrpSpPr>
+        <p:cNvPr id="1" name=""/>
+        <p:cNvGrpSpPr/>
+        <p:nvPr/>
+      </p:nvGrpSpPr>
+      <p:grpSpPr>
+        <a:xfrm>
+          <a:off x="0" y="0"/>
+          <a:ext cx="0" cy="0"/>
+          <a:chOff x="0" y="0"/>
+          <a:chExt cx="0" cy="0"/>
+        </a:xfrm>
+      </p:grpSpPr>
+      <p:pic>
+        <p:nvPicPr>
+          <p:cNvPr id="2" name="Picture 1"/>
+          <p:cNvPicPr>
+            <a:picLocks noChangeAspect="1"/>
+          </p:cNvPicPr>
+          <p:nvPr/>
+        </p:nvPicPr>
+        <p:blipFill>
+          <a:blip r:embed="rId2"/>
+          <a:stretch>
+            <a:fillRect/>
+          </a:stretch>
+        </p:blipFill>
+        <p:spPr>
+          <a:xfrm>
+            <a:off x="-409575" y="-228600"/>
+            <a:ext cx="13011150" cy="7315200"/>
+          </a:xfrm>
+          <a:prstGeom prst="rect">
+            <a:avLst/>
+          </a:prstGeom>
+        </p:spPr>
+      </p:pic>
+    </p:spTree>
+    <p:extLst>
+      <p:ext uri="{BB962C8B-B14F-4D97-AF65-F5344CB8AC3E}">
+        <p14:creationId xmlns:p14="http://schemas.microsoft.com/office/powerpoint/2010/main" val="3514288741"/>
+      </p:ext>
+    </p:extLst>
+  </p:cSld>
+  <p:clrMapOvr>
+    <a:masterClrMapping/>
+  </p:clrMapOvr>
+</p:sld>
+</file>
+
+<file path=ppt/slides/slide11.xml><?xml version="1.0" encoding="utf-8"?>
+<p:sld xmlns:a="http://schemas.openxmlformats.org/drawingml/2006/main" xmlns:r="http://schemas.openxmlformats.org/officeDocument/2006/relationships" xmlns:p="http://schemas.openxmlformats.org/presentationml/2006/main">
+  <p:cSld>
+    <p:spTree>
+      <p:nvGrpSpPr>
+        <p:cNvPr id="1" name=""/>
+        <p:cNvGrpSpPr/>
+        <p:nvPr/>
+      </p:nvGrpSpPr>
+      <p:grpSpPr>
+        <a:xfrm>
+          <a:off x="0" y="0"/>
+          <a:ext cx="0" cy="0"/>
+          <a:chOff x="0" y="0"/>
+          <a:chExt cx="0" cy="0"/>
+        </a:xfrm>
+      </p:grpSpPr>
+      <p:pic>
+        <p:nvPicPr>
+          <p:cNvPr id="2" name="Picture 1"/>
+          <p:cNvPicPr>
+            <a:picLocks noChangeAspect="1"/>
+          </p:cNvPicPr>
+          <p:nvPr/>
+        </p:nvPicPr>
+        <p:blipFill>
+          <a:blip r:embed="rId2"/>
+          <a:stretch>
+            <a:fillRect/>
+          </a:stretch>
+        </p:blipFill>
+        <p:spPr>
+          <a:xfrm>
+            <a:off x="-409575" y="-228600"/>
+            <a:ext cx="13011150" cy="7315200"/>
+          </a:xfrm>
+          <a:prstGeom prst="rect">
+            <a:avLst/>
+          </a:prstGeom>
+        </p:spPr>
+      </p:pic>
+    </p:spTree>
+    <p:extLst>
+      <p:ext uri="{BB962C8B-B14F-4D97-AF65-F5344CB8AC3E}">
+        <p14:creationId xmlns:p14="http://schemas.microsoft.com/office/powerpoint/2010/main" val="1143301789"/>
+      </p:ext>
+    </p:extLst>
+  </p:cSld>
+  <p:clrMapOvr>
+    <a:masterClrMapping/>
+  </p:clrMapOvr>
+</p:sld>
+</file>
+
+<file path=ppt/slides/slide12.xml><?xml version="1.0" encoding="utf-8"?>
+<p:sld xmlns:a="http://schemas.openxmlformats.org/drawingml/2006/main" xmlns:r="http://schemas.openxmlformats.org/officeDocument/2006/relationships" xmlns:p="http://schemas.openxmlformats.org/presentationml/2006/main">
+  <p:cSld>
+    <p:spTree>
+      <p:nvGrpSpPr>
+        <p:cNvPr id="1" name=""/>
+        <p:cNvGrpSpPr/>
+        <p:nvPr/>
+      </p:nvGrpSpPr>
+      <p:grpSpPr>
+        <a:xfrm>
+          <a:off x="0" y="0"/>
+          <a:ext cx="0" cy="0"/>
+          <a:chOff x="0" y="0"/>
+          <a:chExt cx="0" cy="0"/>
+        </a:xfrm>
+      </p:grpSpPr>
+      <p:pic>
+        <p:nvPicPr>
+          <p:cNvPr id="2" name="Picture 1"/>
+          <p:cNvPicPr>
+            <a:picLocks noChangeAspect="1"/>
+          </p:cNvPicPr>
+          <p:nvPr/>
+        </p:nvPicPr>
+        <p:blipFill>
+          <a:blip r:embed="rId2"/>
+          <a:stretch>
+            <a:fillRect/>
+          </a:stretch>
+        </p:blipFill>
+        <p:spPr>
+          <a:xfrm>
+            <a:off x="-409575" y="-228600"/>
+            <a:ext cx="13011150" cy="7315200"/>
+          </a:xfrm>
+          <a:prstGeom prst="rect">
+            <a:avLst/>
+          </a:prstGeom>
+        </p:spPr>
+      </p:pic>
+    </p:spTree>
+    <p:extLst>
+      <p:ext uri="{BB962C8B-B14F-4D97-AF65-F5344CB8AC3E}">
+        <p14:creationId xmlns:p14="http://schemas.microsoft.com/office/powerpoint/2010/main" val="3221078245"/>
+      </p:ext>
+    </p:extLst>
+  </p:cSld>
+  <p:clrMapOvr>
+    <a:masterClrMapping/>
+  </p:clrMapOvr>
+</p:sld>
+</file>
+
+<file path=ppt/slides/slide2.xml><?xml version="1.0" encoding="utf-8"?>
+<p:sld xmlns:a="http://schemas.openxmlformats.org/drawingml/2006/main" xmlns:r="http://schemas.openxmlformats.org/officeDocument/2006/relationships" xmlns:p="http://schemas.openxmlformats.org/presentationml/2006/main">
+  <p:cSld>
+    <p:spTree>
+      <p:nvGrpSpPr>
+        <p:cNvPr id="1" name=""/>
+        <p:cNvGrpSpPr/>
+        <p:nvPr/>
+      </p:nvGrpSpPr>
+      <p:grpSpPr>
+        <a:xfrm>
+          <a:off x="0" y="0"/>
+          <a:ext cx="0" cy="0"/>
+          <a:chOff x="0" y="0"/>
+          <a:chExt cx="0" cy="0"/>
+        </a:xfrm>
+      </p:grpSpPr>
+      <p:pic>
+        <p:nvPicPr>
+          <p:cNvPr id="2" name="Picture 1"/>
+          <p:cNvPicPr>
+            <a:picLocks noChangeAspect="1"/>
+          </p:cNvPicPr>
+          <p:nvPr/>
+        </p:nvPicPr>
+        <p:blipFill>
+          <a:blip r:embed="rId2"/>
+          <a:stretch>
+            <a:fillRect/>
+          </a:stretch>
+        </p:blipFill>
+        <p:spPr>
+          <a:xfrm>
+            <a:off x="-409575" y="-228600"/>
+            <a:ext cx="13011150" cy="7315200"/>
+          </a:xfrm>
+          <a:prstGeom prst="rect">
+            <a:avLst/>
+          </a:prstGeom>
+        </p:spPr>
+      </p:pic>
+    </p:spTree>
+    <p:extLst>
+      <p:ext uri="{BB962C8B-B14F-4D97-AF65-F5344CB8AC3E}">
+        <p14:creationId xmlns:p14="http://schemas.microsoft.com/office/powerpoint/2010/main" val="2169657589"/>
+      </p:ext>
+    </p:extLst>
+  </p:cSld>
+  <p:clrMapOvr>
+    <a:masterClrMapping/>
+  </p:clrMapOvr>
+</p:sld>
+</file>
+
+<file path=ppt/slides/slide3.xml><?xml version="1.0" encoding="utf-8"?>
+<p:sld xmlns:a="http://schemas.openxmlformats.org/drawingml/2006/main" xmlns:r="http://schemas.openxmlformats.org/officeDocument/2006/relationships" xmlns:p="http://schemas.openxmlformats.org/presentationml/2006/main">
+  <p:cSld>
+    <p:spTree>
+      <p:nvGrpSpPr>
+        <p:cNvPr id="1" name=""/>
+        <p:cNvGrpSpPr/>
+        <p:nvPr/>
+      </p:nvGrpSpPr>
+      <p:grpSpPr>
+        <a:xfrm>
+          <a:off x="0" y="0"/>
+          <a:ext cx="0" cy="0"/>
+          <a:chOff x="0" y="0"/>
+          <a:chExt cx="0" cy="0"/>
+        </a:xfrm>
+      </p:grpSpPr>
+      <p:pic>
+        <p:nvPicPr>
+          <p:cNvPr id="2" name="Picture 1"/>
+          <p:cNvPicPr>
+            <a:picLocks noChangeAspect="1"/>
+          </p:cNvPicPr>
+          <p:nvPr/>
+        </p:nvPicPr>
+        <p:blipFill>
+          <a:blip r:embed="rId2"/>
+          <a:stretch>
+            <a:fillRect/>
+          </a:stretch>
+        </p:blipFill>
+        <p:spPr>
+          <a:xfrm>
+            <a:off x="-409575" y="-228600"/>
+            <a:ext cx="13011150" cy="7315200"/>
+          </a:xfrm>
+          <a:prstGeom prst="rect">
+            <a:avLst/>
+          </a:prstGeom>
+        </p:spPr>
+      </p:pic>
+    </p:spTree>
+    <p:extLst>
+      <p:ext uri="{BB962C8B-B14F-4D97-AF65-F5344CB8AC3E}">
+        <p14:creationId xmlns:p14="http://schemas.microsoft.com/office/powerpoint/2010/main" val="184345006"/>
+      </p:ext>
+    </p:extLst>
+  </p:cSld>
+  <p:clrMapOvr>
+    <a:masterClrMapping/>
+  </p:clrMapOvr>
+</p:sld>
+</file>
+
+<file path=ppt/slides/slide4.xml><?xml version="1.0" encoding="utf-8"?>
+<p:sld xmlns:a="http://schemas.openxmlformats.org/drawingml/2006/main" xmlns:r="http://schemas.openxmlformats.org/officeDocument/2006/relationships" xmlns:p="http://schemas.openxmlformats.org/presentationml/2006/main">
+  <p:cSld>
+    <p:spTree>
+      <p:nvGrpSpPr>
+        <p:cNvPr id="1" name=""/>
+        <p:cNvGrpSpPr/>
+        <p:nvPr/>
+      </p:nvGrpSpPr>
+      <p:grpSpPr>
+        <a:xfrm>
+          <a:off x="0" y="0"/>
+          <a:ext cx="0" cy="0"/>
+          <a:chOff x="0" y="0"/>
+          <a:chExt cx="0" cy="0"/>
+        </a:xfrm>
+      </p:grpSpPr>
+      <p:pic>
+        <p:nvPicPr>
+          <p:cNvPr id="2" name="Picture 1"/>
+          <p:cNvPicPr>
+            <a:picLocks noChangeAspect="1"/>
+          </p:cNvPicPr>
+          <p:nvPr/>
+        </p:nvPicPr>
+        <p:blipFill>
+          <a:blip r:embed="rId2"/>
+          <a:stretch>
+            <a:fillRect/>
+          </a:stretch>
+        </p:blipFill>
+        <p:spPr>
+          <a:xfrm>
+            <a:off x="-409575" y="-228600"/>
+            <a:ext cx="13011150" cy="7315200"/>
+          </a:xfrm>
+          <a:prstGeom prst="rect">
+            <a:avLst/>
+          </a:prstGeom>
+        </p:spPr>
+      </p:pic>
+    </p:spTree>
+    <p:extLst>
+      <p:ext uri="{BB962C8B-B14F-4D97-AF65-F5344CB8AC3E}">
+        <p14:creationId xmlns:p14="http://schemas.microsoft.com/office/powerpoint/2010/main" val="3182256782"/>
+      </p:ext>
+    </p:extLst>
+  </p:cSld>
+  <p:clrMapOvr>
+    <a:masterClrMapping/>
+  </p:clrMapOvr>
+</p:sld>
+</file>
+
+<file path=ppt/slides/slide5.xml><?xml version="1.0" encoding="utf-8"?>
+<p:sld xmlns:a="http://schemas.openxmlformats.org/drawingml/2006/main" xmlns:r="http://schemas.openxmlformats.org/officeDocument/2006/relationships" xmlns:p="http://schemas.openxmlformats.org/presentationml/2006/main">
+  <p:cSld>
+    <p:spTree>
+      <p:nvGrpSpPr>
+        <p:cNvPr id="1" name=""/>
+        <p:cNvGrpSpPr/>
+        <p:nvPr/>
+      </p:nvGrpSpPr>
+      <p:grpSpPr>
+        <a:xfrm>
+          <a:off x="0" y="0"/>
+          <a:ext cx="0" cy="0"/>
+          <a:chOff x="0" y="0"/>
+          <a:chExt cx="0" cy="0"/>
+        </a:xfrm>
+      </p:grpSpPr>
+      <p:pic>
+        <p:nvPicPr>
+          <p:cNvPr id="2" name="Picture 1"/>
+          <p:cNvPicPr>
+            <a:picLocks noChangeAspect="1"/>
+          </p:cNvPicPr>
+          <p:nvPr/>
+        </p:nvPicPr>
+        <p:blipFill>
+          <a:blip r:embed="rId2"/>
+          <a:stretch>
+            <a:fillRect/>
+          </a:stretch>
+        </p:blipFill>
+        <p:spPr>
+          <a:xfrm>
+            <a:off x="-409575" y="-228600"/>
+            <a:ext cx="13011150" cy="7315200"/>
+          </a:xfrm>
+          <a:prstGeom prst="rect">
+            <a:avLst/>
+          </a:prstGeom>
+        </p:spPr>
+      </p:pic>
+    </p:spTree>
+    <p:extLst>
+      <p:ext uri="{BB962C8B-B14F-4D97-AF65-F5344CB8AC3E}">
+        <p14:creationId xmlns:p14="http://schemas.microsoft.com/office/powerpoint/2010/main" val="2956692437"/>
+      </p:ext>
+    </p:extLst>
+  </p:cSld>
+  <p:clrMapOvr>
+    <a:masterClrMapping/>
+  </p:clrMapOvr>
+</p:sld>
+</file>
+
+<file path=ppt/slides/slide6.xml><?xml version="1.0" encoding="utf-8"?>
+<p:sld xmlns:a="http://schemas.openxmlformats.org/drawingml/2006/main" xmlns:r="http://schemas.openxmlformats.org/officeDocument/2006/relationships" xmlns:p="http://schemas.openxmlformats.org/presentationml/2006/main">
+  <p:cSld>
+    <p:spTree>
+      <p:nvGrpSpPr>
+        <p:cNvPr id="1" name=""/>
+        <p:cNvGrpSpPr/>
+        <p:nvPr/>
+      </p:nvGrpSpPr>
+      <p:grpSpPr>
+        <a:xfrm>
+          <a:off x="0" y="0"/>
+          <a:ext cx="0" cy="0"/>
+          <a:chOff x="0" y="0"/>
+          <a:chExt cx="0" cy="0"/>
+        </a:xfrm>
+      </p:grpSpPr>
+      <p:pic>
+        <p:nvPicPr>
+          <p:cNvPr id="2" name="Picture 1"/>
+          <p:cNvPicPr>
+            <a:picLocks noChangeAspect="1"/>
+          </p:cNvPicPr>
+          <p:nvPr/>
+        </p:nvPicPr>
+        <p:blipFill>
+          <a:blip r:embed="rId2"/>
+          <a:stretch>
+            <a:fillRect/>
+          </a:stretch>
+        </p:blipFill>
+        <p:spPr>
+          <a:xfrm>
+            <a:off x="-409575" y="-228600"/>
+            <a:ext cx="13011150" cy="7315200"/>
+          </a:xfrm>
+          <a:prstGeom prst="rect">
+            <a:avLst/>
+          </a:prstGeom>
+        </p:spPr>
+      </p:pic>
+    </p:spTree>
+    <p:extLst>
+      <p:ext uri="{BB962C8B-B14F-4D97-AF65-F5344CB8AC3E}">
+        <p14:creationId xmlns:p14="http://schemas.microsoft.com/office/powerpoint/2010/main" val="436492561"/>
+      </p:ext>
+    </p:extLst>
+  </p:cSld>
+  <p:clrMapOvr>
+    <a:masterClrMapping/>
+  </p:clrMapOvr>
+</p:sld>
+</file>
+
+<file path=ppt/slides/slide7.xml><?xml version="1.0" encoding="utf-8"?>
+<p:sld xmlns:a="http://schemas.openxmlformats.org/drawingml/2006/main" xmlns:r="http://schemas.openxmlformats.org/officeDocument/2006/relationships" xmlns:p="http://schemas.openxmlformats.org/presentationml/2006/main">
+  <p:cSld>
+    <p:spTree>
+      <p:nvGrpSpPr>
+        <p:cNvPr id="1" name=""/>
+        <p:cNvGrpSpPr/>
+        <p:nvPr/>
+      </p:nvGrpSpPr>
+      <p:grpSpPr>
+        <a:xfrm>
+          <a:off x="0" y="0"/>
+          <a:ext cx="0" cy="0"/>
+          <a:chOff x="0" y="0"/>
+          <a:chExt cx="0" cy="0"/>
+        </a:xfrm>
+      </p:grpSpPr>
+      <p:pic>
+        <p:nvPicPr>
+          <p:cNvPr id="2" name="Picture 1"/>
+          <p:cNvPicPr>
+            <a:picLocks noChangeAspect="1"/>
+          </p:cNvPicPr>
+          <p:nvPr/>
+        </p:nvPicPr>
+        <p:blipFill>
+          <a:blip r:embed="rId2"/>
+          <a:stretch>
+            <a:fillRect/>
+          </a:stretch>
+        </p:blipFill>
+        <p:spPr>
+          <a:xfrm>
+            <a:off x="-409575" y="-228600"/>
+            <a:ext cx="13011150" cy="7315200"/>
+          </a:xfrm>
+          <a:prstGeom prst="rect">
+            <a:avLst/>
+          </a:prstGeom>
+        </p:spPr>
+      </p:pic>
+    </p:spTree>
+    <p:extLst>
+      <p:ext uri="{BB962C8B-B14F-4D97-AF65-F5344CB8AC3E}">
+        <p14:creationId xmlns:p14="http://schemas.microsoft.com/office/powerpoint/2010/main" val="1059766380"/>
+      </p:ext>
+    </p:extLst>
+  </p:cSld>
+  <p:clrMapOvr>
+    <a:masterClrMapping/>
+  </p:clrMapOvr>
+</p:sld>
+</file>
+
+<file path=ppt/slides/slide8.xml><?xml version="1.0" encoding="utf-8"?>
+<p:sld xmlns:a="http://schemas.openxmlformats.org/drawingml/2006/main" xmlns:r="http://schemas.openxmlformats.org/officeDocument/2006/relationships" xmlns:p="http://schemas.openxmlformats.org/presentationml/2006/main">
+  <p:cSld>
+    <p:spTree>
+      <p:nvGrpSpPr>
+        <p:cNvPr id="1" name=""/>
+        <p:cNvGrpSpPr/>
+        <p:nvPr/>
+      </p:nvGrpSpPr>
+      <p:grpSpPr>
+        <a:xfrm>
+          <a:off x="0" y="0"/>
+          <a:ext cx="0" cy="0"/>
+          <a:chOff x="0" y="0"/>
+          <a:chExt cx="0" cy="0"/>
+        </a:xfrm>
+      </p:grpSpPr>
+      <p:pic>
+        <p:nvPicPr>
+          <p:cNvPr id="2" name="Picture 1"/>
+          <p:cNvPicPr>
+            <a:picLocks noChangeAspect="1"/>
+          </p:cNvPicPr>
+          <p:nvPr/>
+        </p:nvPicPr>
+        <p:blipFill>
+          <a:blip r:embed="rId2"/>
+          <a:stretch>
+            <a:fillRect/>
+          </a:stretch>
+        </p:blipFill>
+        <p:spPr>
+          <a:xfrm>
+            <a:off x="-409575" y="-228600"/>
+            <a:ext cx="13011150" cy="7315200"/>
+          </a:xfrm>
+          <a:prstGeom prst="rect">
+            <a:avLst/>
+          </a:prstGeom>
+        </p:spPr>
+      </p:pic>
+    </p:spTree>
+    <p:extLst>
+      <p:ext uri="{BB962C8B-B14F-4D97-AF65-F5344CB8AC3E}">
+        <p14:creationId xmlns:p14="http://schemas.microsoft.com/office/powerpoint/2010/main" val="2579412702"/>
+      </p:ext>
+    </p:extLst>
+  </p:cSld>
+  <p:clrMapOvr>
+    <a:masterClrMapping/>
+  </p:clrMapOvr>
+</p:sld>
+</file>
+
+<file path=ppt/slides/slide9.xml><?xml version="1.0" encoding="utf-8"?>
+<p:sld xmlns:a="http://schemas.openxmlformats.org/drawingml/2006/main" xmlns:r="http://schemas.openxmlformats.org/officeDocument/2006/relationships" xmlns:p="http://schemas.openxmlformats.org/presentationml/2006/main">
+  <p:cSld>
+    <p:spTree>
+      <p:nvGrpSpPr>
+        <p:cNvPr id="1" name=""/>
+        <p:cNvGrpSpPr/>
+        <p:nvPr/>
+      </p:nvGrpSpPr>
+      <p:grpSpPr>
+        <a:xfrm>
+          <a:off x="0" y="0"/>
+          <a:ext cx="0" cy="0"/>
+          <a:chOff x="0" y="0"/>
+          <a:chExt cx="0" cy="0"/>
+        </a:xfrm>
+      </p:grpSpPr>
+      <p:pic>
+        <p:nvPicPr>
+          <p:cNvPr id="2" name="Picture 1"/>
+          <p:cNvPicPr>
+            <a:picLocks noChangeAspect="1"/>
+          </p:cNvPicPr>
+          <p:nvPr/>
+        </p:nvPicPr>
+        <p:blipFill>
+          <a:blip r:embed="rId2"/>
+          <a:stretch>
+            <a:fillRect/>
+          </a:stretch>
+        </p:blipFill>
+        <p:spPr>
+          <a:xfrm>
+            <a:off x="-409575" y="-228600"/>
+            <a:ext cx="13011150" cy="7315200"/>
+          </a:xfrm>
+          <a:prstGeom prst="rect">
+            <a:avLst/>
+          </a:prstGeom>
+        </p:spPr>
+      </p:pic>
+    </p:spTree>
+    <p:extLst>
+      <p:ext uri="{BB962C8B-B14F-4D97-AF65-F5344CB8AC3E}">
+        <p14:creationId xmlns:p14="http://schemas.microsoft.com/office/powerpoint/2010/main" val="2312226953"/>
+      </p:ext>
+    </p:extLst>
+  </p:cSld>
+  <p:clrMapOvr>
+    <a:masterClrMapping/>
+  </p:clrMapOvr>
+</p:sld>
+</file>
+
 <file path=ppt/theme/theme1.xml><?xml version="1.0" encoding="utf-8"?>
 <a:theme xmlns:a="http://schemas.openxmlformats.org/drawingml/2006/main" name="Office Theme">
   <a:themeElements>

</xml_diff>

<commit_message>
updated the rest of the questions
</commit_message>
<xml_diff>
--- a/AZ-900/Practice-Test2.pptx
+++ b/AZ-900/Practice-Test2.pptx
@@ -17,6 +17,52 @@
     <p:sldId id="265" r:id="rId11"/>
     <p:sldId id="266" r:id="rId12"/>
     <p:sldId id="267" r:id="rId13"/>
+    <p:sldId id="268" r:id="rId14"/>
+    <p:sldId id="269" r:id="rId15"/>
+    <p:sldId id="270" r:id="rId16"/>
+    <p:sldId id="271" r:id="rId17"/>
+    <p:sldId id="272" r:id="rId18"/>
+    <p:sldId id="273" r:id="rId19"/>
+    <p:sldId id="274" r:id="rId20"/>
+    <p:sldId id="275" r:id="rId21"/>
+    <p:sldId id="276" r:id="rId22"/>
+    <p:sldId id="277" r:id="rId23"/>
+    <p:sldId id="278" r:id="rId24"/>
+    <p:sldId id="279" r:id="rId25"/>
+    <p:sldId id="280" r:id="rId26"/>
+    <p:sldId id="281" r:id="rId27"/>
+    <p:sldId id="282" r:id="rId28"/>
+    <p:sldId id="283" r:id="rId29"/>
+    <p:sldId id="284" r:id="rId30"/>
+    <p:sldId id="285" r:id="rId31"/>
+    <p:sldId id="286" r:id="rId32"/>
+    <p:sldId id="287" r:id="rId33"/>
+    <p:sldId id="288" r:id="rId34"/>
+    <p:sldId id="289" r:id="rId35"/>
+    <p:sldId id="290" r:id="rId36"/>
+    <p:sldId id="291" r:id="rId37"/>
+    <p:sldId id="292" r:id="rId38"/>
+    <p:sldId id="293" r:id="rId39"/>
+    <p:sldId id="294" r:id="rId40"/>
+    <p:sldId id="295" r:id="rId41"/>
+    <p:sldId id="296" r:id="rId42"/>
+    <p:sldId id="297" r:id="rId43"/>
+    <p:sldId id="298" r:id="rId44"/>
+    <p:sldId id="299" r:id="rId45"/>
+    <p:sldId id="300" r:id="rId46"/>
+    <p:sldId id="301" r:id="rId47"/>
+    <p:sldId id="302" r:id="rId48"/>
+    <p:sldId id="303" r:id="rId49"/>
+    <p:sldId id="304" r:id="rId50"/>
+    <p:sldId id="305" r:id="rId51"/>
+    <p:sldId id="306" r:id="rId52"/>
+    <p:sldId id="307" r:id="rId53"/>
+    <p:sldId id="308" r:id="rId54"/>
+    <p:sldId id="309" r:id="rId55"/>
+    <p:sldId id="310" r:id="rId56"/>
+    <p:sldId id="311" r:id="rId57"/>
+    <p:sldId id="312" r:id="rId58"/>
+    <p:sldId id="313" r:id="rId59"/>
   </p:sldIdLst>
   <p:sldSz cx="12192000" cy="6858000"/>
   <p:notesSz cx="6858000" cy="9144000"/>
@@ -254,7 +300,7 @@
           <a:p>
             <a:fld id="{D74941B4-F143-40D4-BE42-4569D7DC5BCF}" type="datetimeFigureOut">
               <a:rPr lang="en-US" smtClean="0"/>
-              <a:t>7/26/2021</a:t>
+              <a:t>7/27/2021</a:t>
             </a:fld>
             <a:endParaRPr lang="en-US"/>
           </a:p>
@@ -424,7 +470,7 @@
           <a:p>
             <a:fld id="{D74941B4-F143-40D4-BE42-4569D7DC5BCF}" type="datetimeFigureOut">
               <a:rPr lang="en-US" smtClean="0"/>
-              <a:t>7/26/2021</a:t>
+              <a:t>7/27/2021</a:t>
             </a:fld>
             <a:endParaRPr lang="en-US"/>
           </a:p>
@@ -604,7 +650,7 @@
           <a:p>
             <a:fld id="{D74941B4-F143-40D4-BE42-4569D7DC5BCF}" type="datetimeFigureOut">
               <a:rPr lang="en-US" smtClean="0"/>
-              <a:t>7/26/2021</a:t>
+              <a:t>7/27/2021</a:t>
             </a:fld>
             <a:endParaRPr lang="en-US"/>
           </a:p>
@@ -774,7 +820,7 @@
           <a:p>
             <a:fld id="{D74941B4-F143-40D4-BE42-4569D7DC5BCF}" type="datetimeFigureOut">
               <a:rPr lang="en-US" smtClean="0"/>
-              <a:t>7/26/2021</a:t>
+              <a:t>7/27/2021</a:t>
             </a:fld>
             <a:endParaRPr lang="en-US"/>
           </a:p>
@@ -1020,7 +1066,7 @@
           <a:p>
             <a:fld id="{D74941B4-F143-40D4-BE42-4569D7DC5BCF}" type="datetimeFigureOut">
               <a:rPr lang="en-US" smtClean="0"/>
-              <a:t>7/26/2021</a:t>
+              <a:t>7/27/2021</a:t>
             </a:fld>
             <a:endParaRPr lang="en-US"/>
           </a:p>
@@ -1252,7 +1298,7 @@
           <a:p>
             <a:fld id="{D74941B4-F143-40D4-BE42-4569D7DC5BCF}" type="datetimeFigureOut">
               <a:rPr lang="en-US" smtClean="0"/>
-              <a:t>7/26/2021</a:t>
+              <a:t>7/27/2021</a:t>
             </a:fld>
             <a:endParaRPr lang="en-US"/>
           </a:p>
@@ -1619,7 +1665,7 @@
           <a:p>
             <a:fld id="{D74941B4-F143-40D4-BE42-4569D7DC5BCF}" type="datetimeFigureOut">
               <a:rPr lang="en-US" smtClean="0"/>
-              <a:t>7/26/2021</a:t>
+              <a:t>7/27/2021</a:t>
             </a:fld>
             <a:endParaRPr lang="en-US"/>
           </a:p>
@@ -1737,7 +1783,7 @@
           <a:p>
             <a:fld id="{D74941B4-F143-40D4-BE42-4569D7DC5BCF}" type="datetimeFigureOut">
               <a:rPr lang="en-US" smtClean="0"/>
-              <a:t>7/26/2021</a:t>
+              <a:t>7/27/2021</a:t>
             </a:fld>
             <a:endParaRPr lang="en-US"/>
           </a:p>
@@ -1832,7 +1878,7 @@
           <a:p>
             <a:fld id="{D74941B4-F143-40D4-BE42-4569D7DC5BCF}" type="datetimeFigureOut">
               <a:rPr lang="en-US" smtClean="0"/>
-              <a:t>7/26/2021</a:t>
+              <a:t>7/27/2021</a:t>
             </a:fld>
             <a:endParaRPr lang="en-US"/>
           </a:p>
@@ -2109,7 +2155,7 @@
           <a:p>
             <a:fld id="{D74941B4-F143-40D4-BE42-4569D7DC5BCF}" type="datetimeFigureOut">
               <a:rPr lang="en-US" smtClean="0"/>
-              <a:t>7/26/2021</a:t>
+              <a:t>7/27/2021</a:t>
             </a:fld>
             <a:endParaRPr lang="en-US"/>
           </a:p>
@@ -2362,7 +2408,7 @@
           <a:p>
             <a:fld id="{D74941B4-F143-40D4-BE42-4569D7DC5BCF}" type="datetimeFigureOut">
               <a:rPr lang="en-US" smtClean="0"/>
-              <a:t>7/26/2021</a:t>
+              <a:t>7/27/2021</a:t>
             </a:fld>
             <a:endParaRPr lang="en-US"/>
           </a:p>
@@ -2575,7 +2621,7 @@
           <a:p>
             <a:fld id="{D74941B4-F143-40D4-BE42-4569D7DC5BCF}" type="datetimeFigureOut">
               <a:rPr lang="en-US" smtClean="0"/>
-              <a:t>7/26/2021</a:t>
+              <a:t>7/27/2021</a:t>
             </a:fld>
             <a:endParaRPr lang="en-US"/>
           </a:p>
@@ -3179,7 +3225,7 @@
 </p:sld>
 </file>
 
-<file path=ppt/slides/slide2.xml><?xml version="1.0" encoding="utf-8"?>
+<file path=ppt/slides/slide13.xml><?xml version="1.0" encoding="utf-8"?>
 <p:sld xmlns:a="http://schemas.openxmlformats.org/drawingml/2006/main" xmlns:r="http://schemas.openxmlformats.org/officeDocument/2006/relationships" xmlns:p="http://schemas.openxmlformats.org/presentationml/2006/main">
   <p:cSld>
     <p:spTree>
@@ -3223,7 +3269,7 @@
     </p:spTree>
     <p:extLst>
       <p:ext uri="{BB962C8B-B14F-4D97-AF65-F5344CB8AC3E}">
-        <p14:creationId xmlns:p14="http://schemas.microsoft.com/office/powerpoint/2010/main" val="2169657589"/>
+        <p14:creationId xmlns:p14="http://schemas.microsoft.com/office/powerpoint/2010/main" val="1399729354"/>
       </p:ext>
     </p:extLst>
   </p:cSld>
@@ -3233,7 +3279,7 @@
 </p:sld>
 </file>
 
-<file path=ppt/slides/slide3.xml><?xml version="1.0" encoding="utf-8"?>
+<file path=ppt/slides/slide14.xml><?xml version="1.0" encoding="utf-8"?>
 <p:sld xmlns:a="http://schemas.openxmlformats.org/drawingml/2006/main" xmlns:r="http://schemas.openxmlformats.org/officeDocument/2006/relationships" xmlns:p="http://schemas.openxmlformats.org/presentationml/2006/main">
   <p:cSld>
     <p:spTree>
@@ -3277,7 +3323,7 @@
     </p:spTree>
     <p:extLst>
       <p:ext uri="{BB962C8B-B14F-4D97-AF65-F5344CB8AC3E}">
-        <p14:creationId xmlns:p14="http://schemas.microsoft.com/office/powerpoint/2010/main" val="184345006"/>
+        <p14:creationId xmlns:p14="http://schemas.microsoft.com/office/powerpoint/2010/main" val="3375240192"/>
       </p:ext>
     </p:extLst>
   </p:cSld>
@@ -3287,7 +3333,7 @@
 </p:sld>
 </file>
 
-<file path=ppt/slides/slide4.xml><?xml version="1.0" encoding="utf-8"?>
+<file path=ppt/slides/slide15.xml><?xml version="1.0" encoding="utf-8"?>
 <p:sld xmlns:a="http://schemas.openxmlformats.org/drawingml/2006/main" xmlns:r="http://schemas.openxmlformats.org/officeDocument/2006/relationships" xmlns:p="http://schemas.openxmlformats.org/presentationml/2006/main">
   <p:cSld>
     <p:spTree>
@@ -3331,7 +3377,7 @@
     </p:spTree>
     <p:extLst>
       <p:ext uri="{BB962C8B-B14F-4D97-AF65-F5344CB8AC3E}">
-        <p14:creationId xmlns:p14="http://schemas.microsoft.com/office/powerpoint/2010/main" val="3182256782"/>
+        <p14:creationId xmlns:p14="http://schemas.microsoft.com/office/powerpoint/2010/main" val="3205262989"/>
       </p:ext>
     </p:extLst>
   </p:cSld>
@@ -3341,7 +3387,7 @@
 </p:sld>
 </file>
 
-<file path=ppt/slides/slide5.xml><?xml version="1.0" encoding="utf-8"?>
+<file path=ppt/slides/slide16.xml><?xml version="1.0" encoding="utf-8"?>
 <p:sld xmlns:a="http://schemas.openxmlformats.org/drawingml/2006/main" xmlns:r="http://schemas.openxmlformats.org/officeDocument/2006/relationships" xmlns:p="http://schemas.openxmlformats.org/presentationml/2006/main">
   <p:cSld>
     <p:spTree>
@@ -3385,7 +3431,2491 @@
     </p:spTree>
     <p:extLst>
       <p:ext uri="{BB962C8B-B14F-4D97-AF65-F5344CB8AC3E}">
+        <p14:creationId xmlns:p14="http://schemas.microsoft.com/office/powerpoint/2010/main" val="1388150705"/>
+      </p:ext>
+    </p:extLst>
+  </p:cSld>
+  <p:clrMapOvr>
+    <a:masterClrMapping/>
+  </p:clrMapOvr>
+</p:sld>
+</file>
+
+<file path=ppt/slides/slide17.xml><?xml version="1.0" encoding="utf-8"?>
+<p:sld xmlns:a="http://schemas.openxmlformats.org/drawingml/2006/main" xmlns:r="http://schemas.openxmlformats.org/officeDocument/2006/relationships" xmlns:p="http://schemas.openxmlformats.org/presentationml/2006/main">
+  <p:cSld>
+    <p:spTree>
+      <p:nvGrpSpPr>
+        <p:cNvPr id="1" name=""/>
+        <p:cNvGrpSpPr/>
+        <p:nvPr/>
+      </p:nvGrpSpPr>
+      <p:grpSpPr>
+        <a:xfrm>
+          <a:off x="0" y="0"/>
+          <a:ext cx="0" cy="0"/>
+          <a:chOff x="0" y="0"/>
+          <a:chExt cx="0" cy="0"/>
+        </a:xfrm>
+      </p:grpSpPr>
+      <p:pic>
+        <p:nvPicPr>
+          <p:cNvPr id="2" name="Picture 1"/>
+          <p:cNvPicPr>
+            <a:picLocks noChangeAspect="1"/>
+          </p:cNvPicPr>
+          <p:nvPr/>
+        </p:nvPicPr>
+        <p:blipFill>
+          <a:blip r:embed="rId2"/>
+          <a:stretch>
+            <a:fillRect/>
+          </a:stretch>
+        </p:blipFill>
+        <p:spPr>
+          <a:xfrm>
+            <a:off x="-409575" y="-228600"/>
+            <a:ext cx="13011150" cy="7315200"/>
+          </a:xfrm>
+          <a:prstGeom prst="rect">
+            <a:avLst/>
+          </a:prstGeom>
+        </p:spPr>
+      </p:pic>
+    </p:spTree>
+    <p:extLst>
+      <p:ext uri="{BB962C8B-B14F-4D97-AF65-F5344CB8AC3E}">
+        <p14:creationId xmlns:p14="http://schemas.microsoft.com/office/powerpoint/2010/main" val="1948273425"/>
+      </p:ext>
+    </p:extLst>
+  </p:cSld>
+  <p:clrMapOvr>
+    <a:masterClrMapping/>
+  </p:clrMapOvr>
+</p:sld>
+</file>
+
+<file path=ppt/slides/slide18.xml><?xml version="1.0" encoding="utf-8"?>
+<p:sld xmlns:a="http://schemas.openxmlformats.org/drawingml/2006/main" xmlns:r="http://schemas.openxmlformats.org/officeDocument/2006/relationships" xmlns:p="http://schemas.openxmlformats.org/presentationml/2006/main">
+  <p:cSld>
+    <p:spTree>
+      <p:nvGrpSpPr>
+        <p:cNvPr id="1" name=""/>
+        <p:cNvGrpSpPr/>
+        <p:nvPr/>
+      </p:nvGrpSpPr>
+      <p:grpSpPr>
+        <a:xfrm>
+          <a:off x="0" y="0"/>
+          <a:ext cx="0" cy="0"/>
+          <a:chOff x="0" y="0"/>
+          <a:chExt cx="0" cy="0"/>
+        </a:xfrm>
+      </p:grpSpPr>
+      <p:pic>
+        <p:nvPicPr>
+          <p:cNvPr id="2" name="Picture 1"/>
+          <p:cNvPicPr>
+            <a:picLocks noChangeAspect="1"/>
+          </p:cNvPicPr>
+          <p:nvPr/>
+        </p:nvPicPr>
+        <p:blipFill>
+          <a:blip r:embed="rId2"/>
+          <a:stretch>
+            <a:fillRect/>
+          </a:stretch>
+        </p:blipFill>
+        <p:spPr>
+          <a:xfrm>
+            <a:off x="-409575" y="-228600"/>
+            <a:ext cx="13011150" cy="7315200"/>
+          </a:xfrm>
+          <a:prstGeom prst="rect">
+            <a:avLst/>
+          </a:prstGeom>
+        </p:spPr>
+      </p:pic>
+    </p:spTree>
+    <p:extLst>
+      <p:ext uri="{BB962C8B-B14F-4D97-AF65-F5344CB8AC3E}">
+        <p14:creationId xmlns:p14="http://schemas.microsoft.com/office/powerpoint/2010/main" val="3716172109"/>
+      </p:ext>
+    </p:extLst>
+  </p:cSld>
+  <p:clrMapOvr>
+    <a:masterClrMapping/>
+  </p:clrMapOvr>
+</p:sld>
+</file>
+
+<file path=ppt/slides/slide19.xml><?xml version="1.0" encoding="utf-8"?>
+<p:sld xmlns:a="http://schemas.openxmlformats.org/drawingml/2006/main" xmlns:r="http://schemas.openxmlformats.org/officeDocument/2006/relationships" xmlns:p="http://schemas.openxmlformats.org/presentationml/2006/main">
+  <p:cSld>
+    <p:spTree>
+      <p:nvGrpSpPr>
+        <p:cNvPr id="1" name=""/>
+        <p:cNvGrpSpPr/>
+        <p:nvPr/>
+      </p:nvGrpSpPr>
+      <p:grpSpPr>
+        <a:xfrm>
+          <a:off x="0" y="0"/>
+          <a:ext cx="0" cy="0"/>
+          <a:chOff x="0" y="0"/>
+          <a:chExt cx="0" cy="0"/>
+        </a:xfrm>
+      </p:grpSpPr>
+      <p:pic>
+        <p:nvPicPr>
+          <p:cNvPr id="2" name="Picture 1"/>
+          <p:cNvPicPr>
+            <a:picLocks noChangeAspect="1"/>
+          </p:cNvPicPr>
+          <p:nvPr/>
+        </p:nvPicPr>
+        <p:blipFill>
+          <a:blip r:embed="rId2"/>
+          <a:stretch>
+            <a:fillRect/>
+          </a:stretch>
+        </p:blipFill>
+        <p:spPr>
+          <a:xfrm>
+            <a:off x="-409575" y="-228600"/>
+            <a:ext cx="13011150" cy="7315200"/>
+          </a:xfrm>
+          <a:prstGeom prst="rect">
+            <a:avLst/>
+          </a:prstGeom>
+        </p:spPr>
+      </p:pic>
+    </p:spTree>
+    <p:extLst>
+      <p:ext uri="{BB962C8B-B14F-4D97-AF65-F5344CB8AC3E}">
+        <p14:creationId xmlns:p14="http://schemas.microsoft.com/office/powerpoint/2010/main" val="752665567"/>
+      </p:ext>
+    </p:extLst>
+  </p:cSld>
+  <p:clrMapOvr>
+    <a:masterClrMapping/>
+  </p:clrMapOvr>
+</p:sld>
+</file>
+
+<file path=ppt/slides/slide2.xml><?xml version="1.0" encoding="utf-8"?>
+<p:sld xmlns:a="http://schemas.openxmlformats.org/drawingml/2006/main" xmlns:r="http://schemas.openxmlformats.org/officeDocument/2006/relationships" xmlns:p="http://schemas.openxmlformats.org/presentationml/2006/main">
+  <p:cSld>
+    <p:spTree>
+      <p:nvGrpSpPr>
+        <p:cNvPr id="1" name=""/>
+        <p:cNvGrpSpPr/>
+        <p:nvPr/>
+      </p:nvGrpSpPr>
+      <p:grpSpPr>
+        <a:xfrm>
+          <a:off x="0" y="0"/>
+          <a:ext cx="0" cy="0"/>
+          <a:chOff x="0" y="0"/>
+          <a:chExt cx="0" cy="0"/>
+        </a:xfrm>
+      </p:grpSpPr>
+      <p:pic>
+        <p:nvPicPr>
+          <p:cNvPr id="2" name="Picture 1"/>
+          <p:cNvPicPr>
+            <a:picLocks noChangeAspect="1"/>
+          </p:cNvPicPr>
+          <p:nvPr/>
+        </p:nvPicPr>
+        <p:blipFill>
+          <a:blip r:embed="rId2"/>
+          <a:stretch>
+            <a:fillRect/>
+          </a:stretch>
+        </p:blipFill>
+        <p:spPr>
+          <a:xfrm>
+            <a:off x="-409575" y="-228600"/>
+            <a:ext cx="13011150" cy="7315200"/>
+          </a:xfrm>
+          <a:prstGeom prst="rect">
+            <a:avLst/>
+          </a:prstGeom>
+        </p:spPr>
+      </p:pic>
+    </p:spTree>
+    <p:extLst>
+      <p:ext uri="{BB962C8B-B14F-4D97-AF65-F5344CB8AC3E}">
+        <p14:creationId xmlns:p14="http://schemas.microsoft.com/office/powerpoint/2010/main" val="2169657589"/>
+      </p:ext>
+    </p:extLst>
+  </p:cSld>
+  <p:clrMapOvr>
+    <a:masterClrMapping/>
+  </p:clrMapOvr>
+</p:sld>
+</file>
+
+<file path=ppt/slides/slide20.xml><?xml version="1.0" encoding="utf-8"?>
+<p:sld xmlns:a="http://schemas.openxmlformats.org/drawingml/2006/main" xmlns:r="http://schemas.openxmlformats.org/officeDocument/2006/relationships" xmlns:p="http://schemas.openxmlformats.org/presentationml/2006/main">
+  <p:cSld>
+    <p:spTree>
+      <p:nvGrpSpPr>
+        <p:cNvPr id="1" name=""/>
+        <p:cNvGrpSpPr/>
+        <p:nvPr/>
+      </p:nvGrpSpPr>
+      <p:grpSpPr>
+        <a:xfrm>
+          <a:off x="0" y="0"/>
+          <a:ext cx="0" cy="0"/>
+          <a:chOff x="0" y="0"/>
+          <a:chExt cx="0" cy="0"/>
+        </a:xfrm>
+      </p:grpSpPr>
+      <p:pic>
+        <p:nvPicPr>
+          <p:cNvPr id="2" name="Picture 1"/>
+          <p:cNvPicPr>
+            <a:picLocks noChangeAspect="1"/>
+          </p:cNvPicPr>
+          <p:nvPr/>
+        </p:nvPicPr>
+        <p:blipFill>
+          <a:blip r:embed="rId2"/>
+          <a:stretch>
+            <a:fillRect/>
+          </a:stretch>
+        </p:blipFill>
+        <p:spPr>
+          <a:xfrm>
+            <a:off x="-409575" y="-228600"/>
+            <a:ext cx="13011150" cy="7315200"/>
+          </a:xfrm>
+          <a:prstGeom prst="rect">
+            <a:avLst/>
+          </a:prstGeom>
+        </p:spPr>
+      </p:pic>
+    </p:spTree>
+    <p:extLst>
+      <p:ext uri="{BB962C8B-B14F-4D97-AF65-F5344CB8AC3E}">
+        <p14:creationId xmlns:p14="http://schemas.microsoft.com/office/powerpoint/2010/main" val="3170417640"/>
+      </p:ext>
+    </p:extLst>
+  </p:cSld>
+  <p:clrMapOvr>
+    <a:masterClrMapping/>
+  </p:clrMapOvr>
+</p:sld>
+</file>
+
+<file path=ppt/slides/slide21.xml><?xml version="1.0" encoding="utf-8"?>
+<p:sld xmlns:a="http://schemas.openxmlformats.org/drawingml/2006/main" xmlns:r="http://schemas.openxmlformats.org/officeDocument/2006/relationships" xmlns:p="http://schemas.openxmlformats.org/presentationml/2006/main">
+  <p:cSld>
+    <p:spTree>
+      <p:nvGrpSpPr>
+        <p:cNvPr id="1" name=""/>
+        <p:cNvGrpSpPr/>
+        <p:nvPr/>
+      </p:nvGrpSpPr>
+      <p:grpSpPr>
+        <a:xfrm>
+          <a:off x="0" y="0"/>
+          <a:ext cx="0" cy="0"/>
+          <a:chOff x="0" y="0"/>
+          <a:chExt cx="0" cy="0"/>
+        </a:xfrm>
+      </p:grpSpPr>
+      <p:pic>
+        <p:nvPicPr>
+          <p:cNvPr id="2" name="Picture 1"/>
+          <p:cNvPicPr>
+            <a:picLocks noChangeAspect="1"/>
+          </p:cNvPicPr>
+          <p:nvPr/>
+        </p:nvPicPr>
+        <p:blipFill>
+          <a:blip r:embed="rId2"/>
+          <a:stretch>
+            <a:fillRect/>
+          </a:stretch>
+        </p:blipFill>
+        <p:spPr>
+          <a:xfrm>
+            <a:off x="-409575" y="-228600"/>
+            <a:ext cx="13011150" cy="7315200"/>
+          </a:xfrm>
+          <a:prstGeom prst="rect">
+            <a:avLst/>
+          </a:prstGeom>
+        </p:spPr>
+      </p:pic>
+    </p:spTree>
+    <p:extLst>
+      <p:ext uri="{BB962C8B-B14F-4D97-AF65-F5344CB8AC3E}">
+        <p14:creationId xmlns:p14="http://schemas.microsoft.com/office/powerpoint/2010/main" val="3483954068"/>
+      </p:ext>
+    </p:extLst>
+  </p:cSld>
+  <p:clrMapOvr>
+    <a:masterClrMapping/>
+  </p:clrMapOvr>
+</p:sld>
+</file>
+
+<file path=ppt/slides/slide22.xml><?xml version="1.0" encoding="utf-8"?>
+<p:sld xmlns:a="http://schemas.openxmlformats.org/drawingml/2006/main" xmlns:r="http://schemas.openxmlformats.org/officeDocument/2006/relationships" xmlns:p="http://schemas.openxmlformats.org/presentationml/2006/main">
+  <p:cSld>
+    <p:spTree>
+      <p:nvGrpSpPr>
+        <p:cNvPr id="1" name=""/>
+        <p:cNvGrpSpPr/>
+        <p:nvPr/>
+      </p:nvGrpSpPr>
+      <p:grpSpPr>
+        <a:xfrm>
+          <a:off x="0" y="0"/>
+          <a:ext cx="0" cy="0"/>
+          <a:chOff x="0" y="0"/>
+          <a:chExt cx="0" cy="0"/>
+        </a:xfrm>
+      </p:grpSpPr>
+      <p:pic>
+        <p:nvPicPr>
+          <p:cNvPr id="2" name="Picture 1"/>
+          <p:cNvPicPr>
+            <a:picLocks noChangeAspect="1"/>
+          </p:cNvPicPr>
+          <p:nvPr/>
+        </p:nvPicPr>
+        <p:blipFill>
+          <a:blip r:embed="rId2"/>
+          <a:stretch>
+            <a:fillRect/>
+          </a:stretch>
+        </p:blipFill>
+        <p:spPr>
+          <a:xfrm>
+            <a:off x="-409575" y="-228600"/>
+            <a:ext cx="13011150" cy="7315200"/>
+          </a:xfrm>
+          <a:prstGeom prst="rect">
+            <a:avLst/>
+          </a:prstGeom>
+        </p:spPr>
+      </p:pic>
+    </p:spTree>
+    <p:extLst>
+      <p:ext uri="{BB962C8B-B14F-4D97-AF65-F5344CB8AC3E}">
+        <p14:creationId xmlns:p14="http://schemas.microsoft.com/office/powerpoint/2010/main" val="2819519914"/>
+      </p:ext>
+    </p:extLst>
+  </p:cSld>
+  <p:clrMapOvr>
+    <a:masterClrMapping/>
+  </p:clrMapOvr>
+</p:sld>
+</file>
+
+<file path=ppt/slides/slide23.xml><?xml version="1.0" encoding="utf-8"?>
+<p:sld xmlns:a="http://schemas.openxmlformats.org/drawingml/2006/main" xmlns:r="http://schemas.openxmlformats.org/officeDocument/2006/relationships" xmlns:p="http://schemas.openxmlformats.org/presentationml/2006/main">
+  <p:cSld>
+    <p:spTree>
+      <p:nvGrpSpPr>
+        <p:cNvPr id="1" name=""/>
+        <p:cNvGrpSpPr/>
+        <p:nvPr/>
+      </p:nvGrpSpPr>
+      <p:grpSpPr>
+        <a:xfrm>
+          <a:off x="0" y="0"/>
+          <a:ext cx="0" cy="0"/>
+          <a:chOff x="0" y="0"/>
+          <a:chExt cx="0" cy="0"/>
+        </a:xfrm>
+      </p:grpSpPr>
+      <p:pic>
+        <p:nvPicPr>
+          <p:cNvPr id="2" name="Picture 1"/>
+          <p:cNvPicPr>
+            <a:picLocks noChangeAspect="1"/>
+          </p:cNvPicPr>
+          <p:nvPr/>
+        </p:nvPicPr>
+        <p:blipFill>
+          <a:blip r:embed="rId2"/>
+          <a:stretch>
+            <a:fillRect/>
+          </a:stretch>
+        </p:blipFill>
+        <p:spPr>
+          <a:xfrm>
+            <a:off x="-409575" y="-228600"/>
+            <a:ext cx="13011150" cy="7315200"/>
+          </a:xfrm>
+          <a:prstGeom prst="rect">
+            <a:avLst/>
+          </a:prstGeom>
+        </p:spPr>
+      </p:pic>
+    </p:spTree>
+    <p:extLst>
+      <p:ext uri="{BB962C8B-B14F-4D97-AF65-F5344CB8AC3E}">
+        <p14:creationId xmlns:p14="http://schemas.microsoft.com/office/powerpoint/2010/main" val="644987883"/>
+      </p:ext>
+    </p:extLst>
+  </p:cSld>
+  <p:clrMapOvr>
+    <a:masterClrMapping/>
+  </p:clrMapOvr>
+</p:sld>
+</file>
+
+<file path=ppt/slides/slide24.xml><?xml version="1.0" encoding="utf-8"?>
+<p:sld xmlns:a="http://schemas.openxmlformats.org/drawingml/2006/main" xmlns:r="http://schemas.openxmlformats.org/officeDocument/2006/relationships" xmlns:p="http://schemas.openxmlformats.org/presentationml/2006/main">
+  <p:cSld>
+    <p:spTree>
+      <p:nvGrpSpPr>
+        <p:cNvPr id="1" name=""/>
+        <p:cNvGrpSpPr/>
+        <p:nvPr/>
+      </p:nvGrpSpPr>
+      <p:grpSpPr>
+        <a:xfrm>
+          <a:off x="0" y="0"/>
+          <a:ext cx="0" cy="0"/>
+          <a:chOff x="0" y="0"/>
+          <a:chExt cx="0" cy="0"/>
+        </a:xfrm>
+      </p:grpSpPr>
+      <p:pic>
+        <p:nvPicPr>
+          <p:cNvPr id="2" name="Picture 1"/>
+          <p:cNvPicPr>
+            <a:picLocks noChangeAspect="1"/>
+          </p:cNvPicPr>
+          <p:nvPr/>
+        </p:nvPicPr>
+        <p:blipFill>
+          <a:blip r:embed="rId2"/>
+          <a:stretch>
+            <a:fillRect/>
+          </a:stretch>
+        </p:blipFill>
+        <p:spPr>
+          <a:xfrm>
+            <a:off x="-409575" y="-228600"/>
+            <a:ext cx="13011150" cy="7315200"/>
+          </a:xfrm>
+          <a:prstGeom prst="rect">
+            <a:avLst/>
+          </a:prstGeom>
+        </p:spPr>
+      </p:pic>
+    </p:spTree>
+    <p:extLst>
+      <p:ext uri="{BB962C8B-B14F-4D97-AF65-F5344CB8AC3E}">
+        <p14:creationId xmlns:p14="http://schemas.microsoft.com/office/powerpoint/2010/main" val="3303867405"/>
+      </p:ext>
+    </p:extLst>
+  </p:cSld>
+  <p:clrMapOvr>
+    <a:masterClrMapping/>
+  </p:clrMapOvr>
+</p:sld>
+</file>
+
+<file path=ppt/slides/slide25.xml><?xml version="1.0" encoding="utf-8"?>
+<p:sld xmlns:a="http://schemas.openxmlformats.org/drawingml/2006/main" xmlns:r="http://schemas.openxmlformats.org/officeDocument/2006/relationships" xmlns:p="http://schemas.openxmlformats.org/presentationml/2006/main">
+  <p:cSld>
+    <p:spTree>
+      <p:nvGrpSpPr>
+        <p:cNvPr id="1" name=""/>
+        <p:cNvGrpSpPr/>
+        <p:nvPr/>
+      </p:nvGrpSpPr>
+      <p:grpSpPr>
+        <a:xfrm>
+          <a:off x="0" y="0"/>
+          <a:ext cx="0" cy="0"/>
+          <a:chOff x="0" y="0"/>
+          <a:chExt cx="0" cy="0"/>
+        </a:xfrm>
+      </p:grpSpPr>
+      <p:pic>
+        <p:nvPicPr>
+          <p:cNvPr id="2" name="Picture 1"/>
+          <p:cNvPicPr>
+            <a:picLocks noChangeAspect="1"/>
+          </p:cNvPicPr>
+          <p:nvPr/>
+        </p:nvPicPr>
+        <p:blipFill>
+          <a:blip r:embed="rId2"/>
+          <a:stretch>
+            <a:fillRect/>
+          </a:stretch>
+        </p:blipFill>
+        <p:spPr>
+          <a:xfrm>
+            <a:off x="-409575" y="-228600"/>
+            <a:ext cx="13011150" cy="7315200"/>
+          </a:xfrm>
+          <a:prstGeom prst="rect">
+            <a:avLst/>
+          </a:prstGeom>
+        </p:spPr>
+      </p:pic>
+    </p:spTree>
+    <p:extLst>
+      <p:ext uri="{BB962C8B-B14F-4D97-AF65-F5344CB8AC3E}">
+        <p14:creationId xmlns:p14="http://schemas.microsoft.com/office/powerpoint/2010/main" val="1068998316"/>
+      </p:ext>
+    </p:extLst>
+  </p:cSld>
+  <p:clrMapOvr>
+    <a:masterClrMapping/>
+  </p:clrMapOvr>
+</p:sld>
+</file>
+
+<file path=ppt/slides/slide26.xml><?xml version="1.0" encoding="utf-8"?>
+<p:sld xmlns:a="http://schemas.openxmlformats.org/drawingml/2006/main" xmlns:r="http://schemas.openxmlformats.org/officeDocument/2006/relationships" xmlns:p="http://schemas.openxmlformats.org/presentationml/2006/main">
+  <p:cSld>
+    <p:spTree>
+      <p:nvGrpSpPr>
+        <p:cNvPr id="1" name=""/>
+        <p:cNvGrpSpPr/>
+        <p:nvPr/>
+      </p:nvGrpSpPr>
+      <p:grpSpPr>
+        <a:xfrm>
+          <a:off x="0" y="0"/>
+          <a:ext cx="0" cy="0"/>
+          <a:chOff x="0" y="0"/>
+          <a:chExt cx="0" cy="0"/>
+        </a:xfrm>
+      </p:grpSpPr>
+      <p:pic>
+        <p:nvPicPr>
+          <p:cNvPr id="2" name="Picture 1"/>
+          <p:cNvPicPr>
+            <a:picLocks noChangeAspect="1"/>
+          </p:cNvPicPr>
+          <p:nvPr/>
+        </p:nvPicPr>
+        <p:blipFill>
+          <a:blip r:embed="rId2"/>
+          <a:stretch>
+            <a:fillRect/>
+          </a:stretch>
+        </p:blipFill>
+        <p:spPr>
+          <a:xfrm>
+            <a:off x="-409575" y="-228600"/>
+            <a:ext cx="13011150" cy="7315200"/>
+          </a:xfrm>
+          <a:prstGeom prst="rect">
+            <a:avLst/>
+          </a:prstGeom>
+        </p:spPr>
+      </p:pic>
+    </p:spTree>
+    <p:extLst>
+      <p:ext uri="{BB962C8B-B14F-4D97-AF65-F5344CB8AC3E}">
+        <p14:creationId xmlns:p14="http://schemas.microsoft.com/office/powerpoint/2010/main" val="1891216849"/>
+      </p:ext>
+    </p:extLst>
+  </p:cSld>
+  <p:clrMapOvr>
+    <a:masterClrMapping/>
+  </p:clrMapOvr>
+</p:sld>
+</file>
+
+<file path=ppt/slides/slide27.xml><?xml version="1.0" encoding="utf-8"?>
+<p:sld xmlns:a="http://schemas.openxmlformats.org/drawingml/2006/main" xmlns:r="http://schemas.openxmlformats.org/officeDocument/2006/relationships" xmlns:p="http://schemas.openxmlformats.org/presentationml/2006/main">
+  <p:cSld>
+    <p:spTree>
+      <p:nvGrpSpPr>
+        <p:cNvPr id="1" name=""/>
+        <p:cNvGrpSpPr/>
+        <p:nvPr/>
+      </p:nvGrpSpPr>
+      <p:grpSpPr>
+        <a:xfrm>
+          <a:off x="0" y="0"/>
+          <a:ext cx="0" cy="0"/>
+          <a:chOff x="0" y="0"/>
+          <a:chExt cx="0" cy="0"/>
+        </a:xfrm>
+      </p:grpSpPr>
+      <p:pic>
+        <p:nvPicPr>
+          <p:cNvPr id="2" name="Picture 1"/>
+          <p:cNvPicPr>
+            <a:picLocks noChangeAspect="1"/>
+          </p:cNvPicPr>
+          <p:nvPr/>
+        </p:nvPicPr>
+        <p:blipFill>
+          <a:blip r:embed="rId2"/>
+          <a:stretch>
+            <a:fillRect/>
+          </a:stretch>
+        </p:blipFill>
+        <p:spPr>
+          <a:xfrm>
+            <a:off x="-409575" y="-228600"/>
+            <a:ext cx="13011150" cy="7315200"/>
+          </a:xfrm>
+          <a:prstGeom prst="rect">
+            <a:avLst/>
+          </a:prstGeom>
+        </p:spPr>
+      </p:pic>
+    </p:spTree>
+    <p:extLst>
+      <p:ext uri="{BB962C8B-B14F-4D97-AF65-F5344CB8AC3E}">
+        <p14:creationId xmlns:p14="http://schemas.microsoft.com/office/powerpoint/2010/main" val="285223131"/>
+      </p:ext>
+    </p:extLst>
+  </p:cSld>
+  <p:clrMapOvr>
+    <a:masterClrMapping/>
+  </p:clrMapOvr>
+</p:sld>
+</file>
+
+<file path=ppt/slides/slide28.xml><?xml version="1.0" encoding="utf-8"?>
+<p:sld xmlns:a="http://schemas.openxmlformats.org/drawingml/2006/main" xmlns:r="http://schemas.openxmlformats.org/officeDocument/2006/relationships" xmlns:p="http://schemas.openxmlformats.org/presentationml/2006/main">
+  <p:cSld>
+    <p:spTree>
+      <p:nvGrpSpPr>
+        <p:cNvPr id="1" name=""/>
+        <p:cNvGrpSpPr/>
+        <p:nvPr/>
+      </p:nvGrpSpPr>
+      <p:grpSpPr>
+        <a:xfrm>
+          <a:off x="0" y="0"/>
+          <a:ext cx="0" cy="0"/>
+          <a:chOff x="0" y="0"/>
+          <a:chExt cx="0" cy="0"/>
+        </a:xfrm>
+      </p:grpSpPr>
+      <p:pic>
+        <p:nvPicPr>
+          <p:cNvPr id="2" name="Picture 1"/>
+          <p:cNvPicPr>
+            <a:picLocks noChangeAspect="1"/>
+          </p:cNvPicPr>
+          <p:nvPr/>
+        </p:nvPicPr>
+        <p:blipFill>
+          <a:blip r:embed="rId2"/>
+          <a:stretch>
+            <a:fillRect/>
+          </a:stretch>
+        </p:blipFill>
+        <p:spPr>
+          <a:xfrm>
+            <a:off x="-409575" y="-228600"/>
+            <a:ext cx="13011150" cy="7315200"/>
+          </a:xfrm>
+          <a:prstGeom prst="rect">
+            <a:avLst/>
+          </a:prstGeom>
+        </p:spPr>
+      </p:pic>
+    </p:spTree>
+    <p:extLst>
+      <p:ext uri="{BB962C8B-B14F-4D97-AF65-F5344CB8AC3E}">
+        <p14:creationId xmlns:p14="http://schemas.microsoft.com/office/powerpoint/2010/main" val="3383451094"/>
+      </p:ext>
+    </p:extLst>
+  </p:cSld>
+  <p:clrMapOvr>
+    <a:masterClrMapping/>
+  </p:clrMapOvr>
+</p:sld>
+</file>
+
+<file path=ppt/slides/slide29.xml><?xml version="1.0" encoding="utf-8"?>
+<p:sld xmlns:a="http://schemas.openxmlformats.org/drawingml/2006/main" xmlns:r="http://schemas.openxmlformats.org/officeDocument/2006/relationships" xmlns:p="http://schemas.openxmlformats.org/presentationml/2006/main">
+  <p:cSld>
+    <p:spTree>
+      <p:nvGrpSpPr>
+        <p:cNvPr id="1" name=""/>
+        <p:cNvGrpSpPr/>
+        <p:nvPr/>
+      </p:nvGrpSpPr>
+      <p:grpSpPr>
+        <a:xfrm>
+          <a:off x="0" y="0"/>
+          <a:ext cx="0" cy="0"/>
+          <a:chOff x="0" y="0"/>
+          <a:chExt cx="0" cy="0"/>
+        </a:xfrm>
+      </p:grpSpPr>
+      <p:pic>
+        <p:nvPicPr>
+          <p:cNvPr id="2" name="Picture 1"/>
+          <p:cNvPicPr>
+            <a:picLocks noChangeAspect="1"/>
+          </p:cNvPicPr>
+          <p:nvPr/>
+        </p:nvPicPr>
+        <p:blipFill>
+          <a:blip r:embed="rId2"/>
+          <a:stretch>
+            <a:fillRect/>
+          </a:stretch>
+        </p:blipFill>
+        <p:spPr>
+          <a:xfrm>
+            <a:off x="-409575" y="-228600"/>
+            <a:ext cx="13011150" cy="7315200"/>
+          </a:xfrm>
+          <a:prstGeom prst="rect">
+            <a:avLst/>
+          </a:prstGeom>
+        </p:spPr>
+      </p:pic>
+    </p:spTree>
+    <p:extLst>
+      <p:ext uri="{BB962C8B-B14F-4D97-AF65-F5344CB8AC3E}">
+        <p14:creationId xmlns:p14="http://schemas.microsoft.com/office/powerpoint/2010/main" val="1226130012"/>
+      </p:ext>
+    </p:extLst>
+  </p:cSld>
+  <p:clrMapOvr>
+    <a:masterClrMapping/>
+  </p:clrMapOvr>
+</p:sld>
+</file>
+
+<file path=ppt/slides/slide3.xml><?xml version="1.0" encoding="utf-8"?>
+<p:sld xmlns:a="http://schemas.openxmlformats.org/drawingml/2006/main" xmlns:r="http://schemas.openxmlformats.org/officeDocument/2006/relationships" xmlns:p="http://schemas.openxmlformats.org/presentationml/2006/main">
+  <p:cSld>
+    <p:spTree>
+      <p:nvGrpSpPr>
+        <p:cNvPr id="1" name=""/>
+        <p:cNvGrpSpPr/>
+        <p:nvPr/>
+      </p:nvGrpSpPr>
+      <p:grpSpPr>
+        <a:xfrm>
+          <a:off x="0" y="0"/>
+          <a:ext cx="0" cy="0"/>
+          <a:chOff x="0" y="0"/>
+          <a:chExt cx="0" cy="0"/>
+        </a:xfrm>
+      </p:grpSpPr>
+      <p:pic>
+        <p:nvPicPr>
+          <p:cNvPr id="2" name="Picture 1"/>
+          <p:cNvPicPr>
+            <a:picLocks noChangeAspect="1"/>
+          </p:cNvPicPr>
+          <p:nvPr/>
+        </p:nvPicPr>
+        <p:blipFill>
+          <a:blip r:embed="rId2"/>
+          <a:stretch>
+            <a:fillRect/>
+          </a:stretch>
+        </p:blipFill>
+        <p:spPr>
+          <a:xfrm>
+            <a:off x="-409575" y="-228600"/>
+            <a:ext cx="13011150" cy="7315200"/>
+          </a:xfrm>
+          <a:prstGeom prst="rect">
+            <a:avLst/>
+          </a:prstGeom>
+        </p:spPr>
+      </p:pic>
+    </p:spTree>
+    <p:extLst>
+      <p:ext uri="{BB962C8B-B14F-4D97-AF65-F5344CB8AC3E}">
+        <p14:creationId xmlns:p14="http://schemas.microsoft.com/office/powerpoint/2010/main" val="184345006"/>
+      </p:ext>
+    </p:extLst>
+  </p:cSld>
+  <p:clrMapOvr>
+    <a:masterClrMapping/>
+  </p:clrMapOvr>
+</p:sld>
+</file>
+
+<file path=ppt/slides/slide30.xml><?xml version="1.0" encoding="utf-8"?>
+<p:sld xmlns:a="http://schemas.openxmlformats.org/drawingml/2006/main" xmlns:r="http://schemas.openxmlformats.org/officeDocument/2006/relationships" xmlns:p="http://schemas.openxmlformats.org/presentationml/2006/main">
+  <p:cSld>
+    <p:spTree>
+      <p:nvGrpSpPr>
+        <p:cNvPr id="1" name=""/>
+        <p:cNvGrpSpPr/>
+        <p:nvPr/>
+      </p:nvGrpSpPr>
+      <p:grpSpPr>
+        <a:xfrm>
+          <a:off x="0" y="0"/>
+          <a:ext cx="0" cy="0"/>
+          <a:chOff x="0" y="0"/>
+          <a:chExt cx="0" cy="0"/>
+        </a:xfrm>
+      </p:grpSpPr>
+      <p:pic>
+        <p:nvPicPr>
+          <p:cNvPr id="2" name="Picture 1"/>
+          <p:cNvPicPr>
+            <a:picLocks noChangeAspect="1"/>
+          </p:cNvPicPr>
+          <p:nvPr/>
+        </p:nvPicPr>
+        <p:blipFill>
+          <a:blip r:embed="rId2"/>
+          <a:stretch>
+            <a:fillRect/>
+          </a:stretch>
+        </p:blipFill>
+        <p:spPr>
+          <a:xfrm>
+            <a:off x="-409575" y="-228600"/>
+            <a:ext cx="13011150" cy="7315200"/>
+          </a:xfrm>
+          <a:prstGeom prst="rect">
+            <a:avLst/>
+          </a:prstGeom>
+        </p:spPr>
+      </p:pic>
+    </p:spTree>
+    <p:extLst>
+      <p:ext uri="{BB962C8B-B14F-4D97-AF65-F5344CB8AC3E}">
+        <p14:creationId xmlns:p14="http://schemas.microsoft.com/office/powerpoint/2010/main" val="45395043"/>
+      </p:ext>
+    </p:extLst>
+  </p:cSld>
+  <p:clrMapOvr>
+    <a:masterClrMapping/>
+  </p:clrMapOvr>
+</p:sld>
+</file>
+
+<file path=ppt/slides/slide31.xml><?xml version="1.0" encoding="utf-8"?>
+<p:sld xmlns:a="http://schemas.openxmlformats.org/drawingml/2006/main" xmlns:r="http://schemas.openxmlformats.org/officeDocument/2006/relationships" xmlns:p="http://schemas.openxmlformats.org/presentationml/2006/main">
+  <p:cSld>
+    <p:spTree>
+      <p:nvGrpSpPr>
+        <p:cNvPr id="1" name=""/>
+        <p:cNvGrpSpPr/>
+        <p:nvPr/>
+      </p:nvGrpSpPr>
+      <p:grpSpPr>
+        <a:xfrm>
+          <a:off x="0" y="0"/>
+          <a:ext cx="0" cy="0"/>
+          <a:chOff x="0" y="0"/>
+          <a:chExt cx="0" cy="0"/>
+        </a:xfrm>
+      </p:grpSpPr>
+      <p:pic>
+        <p:nvPicPr>
+          <p:cNvPr id="2" name="Picture 1"/>
+          <p:cNvPicPr>
+            <a:picLocks noChangeAspect="1"/>
+          </p:cNvPicPr>
+          <p:nvPr/>
+        </p:nvPicPr>
+        <p:blipFill>
+          <a:blip r:embed="rId2"/>
+          <a:stretch>
+            <a:fillRect/>
+          </a:stretch>
+        </p:blipFill>
+        <p:spPr>
+          <a:xfrm>
+            <a:off x="-409575" y="-228600"/>
+            <a:ext cx="13011150" cy="7315200"/>
+          </a:xfrm>
+          <a:prstGeom prst="rect">
+            <a:avLst/>
+          </a:prstGeom>
+        </p:spPr>
+      </p:pic>
+    </p:spTree>
+    <p:extLst>
+      <p:ext uri="{BB962C8B-B14F-4D97-AF65-F5344CB8AC3E}">
+        <p14:creationId xmlns:p14="http://schemas.microsoft.com/office/powerpoint/2010/main" val="3020088062"/>
+      </p:ext>
+    </p:extLst>
+  </p:cSld>
+  <p:clrMapOvr>
+    <a:masterClrMapping/>
+  </p:clrMapOvr>
+</p:sld>
+</file>
+
+<file path=ppt/slides/slide32.xml><?xml version="1.0" encoding="utf-8"?>
+<p:sld xmlns:a="http://schemas.openxmlformats.org/drawingml/2006/main" xmlns:r="http://schemas.openxmlformats.org/officeDocument/2006/relationships" xmlns:p="http://schemas.openxmlformats.org/presentationml/2006/main">
+  <p:cSld>
+    <p:spTree>
+      <p:nvGrpSpPr>
+        <p:cNvPr id="1" name=""/>
+        <p:cNvGrpSpPr/>
+        <p:nvPr/>
+      </p:nvGrpSpPr>
+      <p:grpSpPr>
+        <a:xfrm>
+          <a:off x="0" y="0"/>
+          <a:ext cx="0" cy="0"/>
+          <a:chOff x="0" y="0"/>
+          <a:chExt cx="0" cy="0"/>
+        </a:xfrm>
+      </p:grpSpPr>
+      <p:pic>
+        <p:nvPicPr>
+          <p:cNvPr id="2" name="Picture 1"/>
+          <p:cNvPicPr>
+            <a:picLocks noChangeAspect="1"/>
+          </p:cNvPicPr>
+          <p:nvPr/>
+        </p:nvPicPr>
+        <p:blipFill>
+          <a:blip r:embed="rId2"/>
+          <a:stretch>
+            <a:fillRect/>
+          </a:stretch>
+        </p:blipFill>
+        <p:spPr>
+          <a:xfrm>
+            <a:off x="-409575" y="-228600"/>
+            <a:ext cx="13011150" cy="7315200"/>
+          </a:xfrm>
+          <a:prstGeom prst="rect">
+            <a:avLst/>
+          </a:prstGeom>
+        </p:spPr>
+      </p:pic>
+    </p:spTree>
+    <p:extLst>
+      <p:ext uri="{BB962C8B-B14F-4D97-AF65-F5344CB8AC3E}">
+        <p14:creationId xmlns:p14="http://schemas.microsoft.com/office/powerpoint/2010/main" val="568071853"/>
+      </p:ext>
+    </p:extLst>
+  </p:cSld>
+  <p:clrMapOvr>
+    <a:masterClrMapping/>
+  </p:clrMapOvr>
+</p:sld>
+</file>
+
+<file path=ppt/slides/slide33.xml><?xml version="1.0" encoding="utf-8"?>
+<p:sld xmlns:a="http://schemas.openxmlformats.org/drawingml/2006/main" xmlns:r="http://schemas.openxmlformats.org/officeDocument/2006/relationships" xmlns:p="http://schemas.openxmlformats.org/presentationml/2006/main">
+  <p:cSld>
+    <p:spTree>
+      <p:nvGrpSpPr>
+        <p:cNvPr id="1" name=""/>
+        <p:cNvGrpSpPr/>
+        <p:nvPr/>
+      </p:nvGrpSpPr>
+      <p:grpSpPr>
+        <a:xfrm>
+          <a:off x="0" y="0"/>
+          <a:ext cx="0" cy="0"/>
+          <a:chOff x="0" y="0"/>
+          <a:chExt cx="0" cy="0"/>
+        </a:xfrm>
+      </p:grpSpPr>
+      <p:pic>
+        <p:nvPicPr>
+          <p:cNvPr id="2" name="Picture 1"/>
+          <p:cNvPicPr>
+            <a:picLocks noChangeAspect="1"/>
+          </p:cNvPicPr>
+          <p:nvPr/>
+        </p:nvPicPr>
+        <p:blipFill>
+          <a:blip r:embed="rId2"/>
+          <a:stretch>
+            <a:fillRect/>
+          </a:stretch>
+        </p:blipFill>
+        <p:spPr>
+          <a:xfrm>
+            <a:off x="-409575" y="-228600"/>
+            <a:ext cx="13011150" cy="7315200"/>
+          </a:xfrm>
+          <a:prstGeom prst="rect">
+            <a:avLst/>
+          </a:prstGeom>
+        </p:spPr>
+      </p:pic>
+    </p:spTree>
+    <p:extLst>
+      <p:ext uri="{BB962C8B-B14F-4D97-AF65-F5344CB8AC3E}">
+        <p14:creationId xmlns:p14="http://schemas.microsoft.com/office/powerpoint/2010/main" val="2066385959"/>
+      </p:ext>
+    </p:extLst>
+  </p:cSld>
+  <p:clrMapOvr>
+    <a:masterClrMapping/>
+  </p:clrMapOvr>
+</p:sld>
+</file>
+
+<file path=ppt/slides/slide34.xml><?xml version="1.0" encoding="utf-8"?>
+<p:sld xmlns:a="http://schemas.openxmlformats.org/drawingml/2006/main" xmlns:r="http://schemas.openxmlformats.org/officeDocument/2006/relationships" xmlns:p="http://schemas.openxmlformats.org/presentationml/2006/main">
+  <p:cSld>
+    <p:spTree>
+      <p:nvGrpSpPr>
+        <p:cNvPr id="1" name=""/>
+        <p:cNvGrpSpPr/>
+        <p:nvPr/>
+      </p:nvGrpSpPr>
+      <p:grpSpPr>
+        <a:xfrm>
+          <a:off x="0" y="0"/>
+          <a:ext cx="0" cy="0"/>
+          <a:chOff x="0" y="0"/>
+          <a:chExt cx="0" cy="0"/>
+        </a:xfrm>
+      </p:grpSpPr>
+      <p:pic>
+        <p:nvPicPr>
+          <p:cNvPr id="2" name="Picture 1"/>
+          <p:cNvPicPr>
+            <a:picLocks noChangeAspect="1"/>
+          </p:cNvPicPr>
+          <p:nvPr/>
+        </p:nvPicPr>
+        <p:blipFill>
+          <a:blip r:embed="rId2"/>
+          <a:stretch>
+            <a:fillRect/>
+          </a:stretch>
+        </p:blipFill>
+        <p:spPr>
+          <a:xfrm>
+            <a:off x="-409575" y="-228600"/>
+            <a:ext cx="13011150" cy="7315200"/>
+          </a:xfrm>
+          <a:prstGeom prst="rect">
+            <a:avLst/>
+          </a:prstGeom>
+        </p:spPr>
+      </p:pic>
+    </p:spTree>
+    <p:extLst>
+      <p:ext uri="{BB962C8B-B14F-4D97-AF65-F5344CB8AC3E}">
+        <p14:creationId xmlns:p14="http://schemas.microsoft.com/office/powerpoint/2010/main" val="614754954"/>
+      </p:ext>
+    </p:extLst>
+  </p:cSld>
+  <p:clrMapOvr>
+    <a:masterClrMapping/>
+  </p:clrMapOvr>
+</p:sld>
+</file>
+
+<file path=ppt/slides/slide35.xml><?xml version="1.0" encoding="utf-8"?>
+<p:sld xmlns:a="http://schemas.openxmlformats.org/drawingml/2006/main" xmlns:r="http://schemas.openxmlformats.org/officeDocument/2006/relationships" xmlns:p="http://schemas.openxmlformats.org/presentationml/2006/main">
+  <p:cSld>
+    <p:spTree>
+      <p:nvGrpSpPr>
+        <p:cNvPr id="1" name=""/>
+        <p:cNvGrpSpPr/>
+        <p:nvPr/>
+      </p:nvGrpSpPr>
+      <p:grpSpPr>
+        <a:xfrm>
+          <a:off x="0" y="0"/>
+          <a:ext cx="0" cy="0"/>
+          <a:chOff x="0" y="0"/>
+          <a:chExt cx="0" cy="0"/>
+        </a:xfrm>
+      </p:grpSpPr>
+      <p:pic>
+        <p:nvPicPr>
+          <p:cNvPr id="2" name="Picture 1"/>
+          <p:cNvPicPr>
+            <a:picLocks noChangeAspect="1"/>
+          </p:cNvPicPr>
+          <p:nvPr/>
+        </p:nvPicPr>
+        <p:blipFill>
+          <a:blip r:embed="rId2"/>
+          <a:stretch>
+            <a:fillRect/>
+          </a:stretch>
+        </p:blipFill>
+        <p:spPr>
+          <a:xfrm>
+            <a:off x="-409575" y="-228600"/>
+            <a:ext cx="13011150" cy="7315200"/>
+          </a:xfrm>
+          <a:prstGeom prst="rect">
+            <a:avLst/>
+          </a:prstGeom>
+        </p:spPr>
+      </p:pic>
+    </p:spTree>
+    <p:extLst>
+      <p:ext uri="{BB962C8B-B14F-4D97-AF65-F5344CB8AC3E}">
+        <p14:creationId xmlns:p14="http://schemas.microsoft.com/office/powerpoint/2010/main" val="3790751304"/>
+      </p:ext>
+    </p:extLst>
+  </p:cSld>
+  <p:clrMapOvr>
+    <a:masterClrMapping/>
+  </p:clrMapOvr>
+</p:sld>
+</file>
+
+<file path=ppt/slides/slide36.xml><?xml version="1.0" encoding="utf-8"?>
+<p:sld xmlns:a="http://schemas.openxmlformats.org/drawingml/2006/main" xmlns:r="http://schemas.openxmlformats.org/officeDocument/2006/relationships" xmlns:p="http://schemas.openxmlformats.org/presentationml/2006/main">
+  <p:cSld>
+    <p:spTree>
+      <p:nvGrpSpPr>
+        <p:cNvPr id="1" name=""/>
+        <p:cNvGrpSpPr/>
+        <p:nvPr/>
+      </p:nvGrpSpPr>
+      <p:grpSpPr>
+        <a:xfrm>
+          <a:off x="0" y="0"/>
+          <a:ext cx="0" cy="0"/>
+          <a:chOff x="0" y="0"/>
+          <a:chExt cx="0" cy="0"/>
+        </a:xfrm>
+      </p:grpSpPr>
+      <p:pic>
+        <p:nvPicPr>
+          <p:cNvPr id="2" name="Picture 1"/>
+          <p:cNvPicPr>
+            <a:picLocks noChangeAspect="1"/>
+          </p:cNvPicPr>
+          <p:nvPr/>
+        </p:nvPicPr>
+        <p:blipFill>
+          <a:blip r:embed="rId2"/>
+          <a:stretch>
+            <a:fillRect/>
+          </a:stretch>
+        </p:blipFill>
+        <p:spPr>
+          <a:xfrm>
+            <a:off x="-409575" y="-228600"/>
+            <a:ext cx="13011150" cy="7315200"/>
+          </a:xfrm>
+          <a:prstGeom prst="rect">
+            <a:avLst/>
+          </a:prstGeom>
+        </p:spPr>
+      </p:pic>
+    </p:spTree>
+    <p:extLst>
+      <p:ext uri="{BB962C8B-B14F-4D97-AF65-F5344CB8AC3E}">
+        <p14:creationId xmlns:p14="http://schemas.microsoft.com/office/powerpoint/2010/main" val="2682410695"/>
+      </p:ext>
+    </p:extLst>
+  </p:cSld>
+  <p:clrMapOvr>
+    <a:masterClrMapping/>
+  </p:clrMapOvr>
+</p:sld>
+</file>
+
+<file path=ppt/slides/slide37.xml><?xml version="1.0" encoding="utf-8"?>
+<p:sld xmlns:a="http://schemas.openxmlformats.org/drawingml/2006/main" xmlns:r="http://schemas.openxmlformats.org/officeDocument/2006/relationships" xmlns:p="http://schemas.openxmlformats.org/presentationml/2006/main">
+  <p:cSld>
+    <p:spTree>
+      <p:nvGrpSpPr>
+        <p:cNvPr id="1" name=""/>
+        <p:cNvGrpSpPr/>
+        <p:nvPr/>
+      </p:nvGrpSpPr>
+      <p:grpSpPr>
+        <a:xfrm>
+          <a:off x="0" y="0"/>
+          <a:ext cx="0" cy="0"/>
+          <a:chOff x="0" y="0"/>
+          <a:chExt cx="0" cy="0"/>
+        </a:xfrm>
+      </p:grpSpPr>
+      <p:pic>
+        <p:nvPicPr>
+          <p:cNvPr id="2" name="Picture 1"/>
+          <p:cNvPicPr>
+            <a:picLocks noChangeAspect="1"/>
+          </p:cNvPicPr>
+          <p:nvPr/>
+        </p:nvPicPr>
+        <p:blipFill>
+          <a:blip r:embed="rId2"/>
+          <a:stretch>
+            <a:fillRect/>
+          </a:stretch>
+        </p:blipFill>
+        <p:spPr>
+          <a:xfrm>
+            <a:off x="-409575" y="-228600"/>
+            <a:ext cx="13011150" cy="7315200"/>
+          </a:xfrm>
+          <a:prstGeom prst="rect">
+            <a:avLst/>
+          </a:prstGeom>
+        </p:spPr>
+      </p:pic>
+    </p:spTree>
+    <p:extLst>
+      <p:ext uri="{BB962C8B-B14F-4D97-AF65-F5344CB8AC3E}">
+        <p14:creationId xmlns:p14="http://schemas.microsoft.com/office/powerpoint/2010/main" val="2971211080"/>
+      </p:ext>
+    </p:extLst>
+  </p:cSld>
+  <p:clrMapOvr>
+    <a:masterClrMapping/>
+  </p:clrMapOvr>
+</p:sld>
+</file>
+
+<file path=ppt/slides/slide38.xml><?xml version="1.0" encoding="utf-8"?>
+<p:sld xmlns:a="http://schemas.openxmlformats.org/drawingml/2006/main" xmlns:r="http://schemas.openxmlformats.org/officeDocument/2006/relationships" xmlns:p="http://schemas.openxmlformats.org/presentationml/2006/main">
+  <p:cSld>
+    <p:spTree>
+      <p:nvGrpSpPr>
+        <p:cNvPr id="1" name=""/>
+        <p:cNvGrpSpPr/>
+        <p:nvPr/>
+      </p:nvGrpSpPr>
+      <p:grpSpPr>
+        <a:xfrm>
+          <a:off x="0" y="0"/>
+          <a:ext cx="0" cy="0"/>
+          <a:chOff x="0" y="0"/>
+          <a:chExt cx="0" cy="0"/>
+        </a:xfrm>
+      </p:grpSpPr>
+      <p:pic>
+        <p:nvPicPr>
+          <p:cNvPr id="2" name="Picture 1"/>
+          <p:cNvPicPr>
+            <a:picLocks noChangeAspect="1"/>
+          </p:cNvPicPr>
+          <p:nvPr/>
+        </p:nvPicPr>
+        <p:blipFill>
+          <a:blip r:embed="rId2"/>
+          <a:stretch>
+            <a:fillRect/>
+          </a:stretch>
+        </p:blipFill>
+        <p:spPr>
+          <a:xfrm>
+            <a:off x="-409575" y="-228600"/>
+            <a:ext cx="13011150" cy="7315200"/>
+          </a:xfrm>
+          <a:prstGeom prst="rect">
+            <a:avLst/>
+          </a:prstGeom>
+        </p:spPr>
+      </p:pic>
+    </p:spTree>
+    <p:extLst>
+      <p:ext uri="{BB962C8B-B14F-4D97-AF65-F5344CB8AC3E}">
+        <p14:creationId xmlns:p14="http://schemas.microsoft.com/office/powerpoint/2010/main" val="1321557401"/>
+      </p:ext>
+    </p:extLst>
+  </p:cSld>
+  <p:clrMapOvr>
+    <a:masterClrMapping/>
+  </p:clrMapOvr>
+</p:sld>
+</file>
+
+<file path=ppt/slides/slide39.xml><?xml version="1.0" encoding="utf-8"?>
+<p:sld xmlns:a="http://schemas.openxmlformats.org/drawingml/2006/main" xmlns:r="http://schemas.openxmlformats.org/officeDocument/2006/relationships" xmlns:p="http://schemas.openxmlformats.org/presentationml/2006/main">
+  <p:cSld>
+    <p:spTree>
+      <p:nvGrpSpPr>
+        <p:cNvPr id="1" name=""/>
+        <p:cNvGrpSpPr/>
+        <p:nvPr/>
+      </p:nvGrpSpPr>
+      <p:grpSpPr>
+        <a:xfrm>
+          <a:off x="0" y="0"/>
+          <a:ext cx="0" cy="0"/>
+          <a:chOff x="0" y="0"/>
+          <a:chExt cx="0" cy="0"/>
+        </a:xfrm>
+      </p:grpSpPr>
+      <p:pic>
+        <p:nvPicPr>
+          <p:cNvPr id="2" name="Picture 1"/>
+          <p:cNvPicPr>
+            <a:picLocks noChangeAspect="1"/>
+          </p:cNvPicPr>
+          <p:nvPr/>
+        </p:nvPicPr>
+        <p:blipFill>
+          <a:blip r:embed="rId2"/>
+          <a:stretch>
+            <a:fillRect/>
+          </a:stretch>
+        </p:blipFill>
+        <p:spPr>
+          <a:xfrm>
+            <a:off x="-409575" y="-228600"/>
+            <a:ext cx="13011150" cy="7315200"/>
+          </a:xfrm>
+          <a:prstGeom prst="rect">
+            <a:avLst/>
+          </a:prstGeom>
+        </p:spPr>
+      </p:pic>
+    </p:spTree>
+    <p:extLst>
+      <p:ext uri="{BB962C8B-B14F-4D97-AF65-F5344CB8AC3E}">
+        <p14:creationId xmlns:p14="http://schemas.microsoft.com/office/powerpoint/2010/main" val="4250372432"/>
+      </p:ext>
+    </p:extLst>
+  </p:cSld>
+  <p:clrMapOvr>
+    <a:masterClrMapping/>
+  </p:clrMapOvr>
+</p:sld>
+</file>
+
+<file path=ppt/slides/slide4.xml><?xml version="1.0" encoding="utf-8"?>
+<p:sld xmlns:a="http://schemas.openxmlformats.org/drawingml/2006/main" xmlns:r="http://schemas.openxmlformats.org/officeDocument/2006/relationships" xmlns:p="http://schemas.openxmlformats.org/presentationml/2006/main">
+  <p:cSld>
+    <p:spTree>
+      <p:nvGrpSpPr>
+        <p:cNvPr id="1" name=""/>
+        <p:cNvGrpSpPr/>
+        <p:nvPr/>
+      </p:nvGrpSpPr>
+      <p:grpSpPr>
+        <a:xfrm>
+          <a:off x="0" y="0"/>
+          <a:ext cx="0" cy="0"/>
+          <a:chOff x="0" y="0"/>
+          <a:chExt cx="0" cy="0"/>
+        </a:xfrm>
+      </p:grpSpPr>
+      <p:pic>
+        <p:nvPicPr>
+          <p:cNvPr id="2" name="Picture 1"/>
+          <p:cNvPicPr>
+            <a:picLocks noChangeAspect="1"/>
+          </p:cNvPicPr>
+          <p:nvPr/>
+        </p:nvPicPr>
+        <p:blipFill>
+          <a:blip r:embed="rId2"/>
+          <a:stretch>
+            <a:fillRect/>
+          </a:stretch>
+        </p:blipFill>
+        <p:spPr>
+          <a:xfrm>
+            <a:off x="-409575" y="-228600"/>
+            <a:ext cx="13011150" cy="7315200"/>
+          </a:xfrm>
+          <a:prstGeom prst="rect">
+            <a:avLst/>
+          </a:prstGeom>
+        </p:spPr>
+      </p:pic>
+    </p:spTree>
+    <p:extLst>
+      <p:ext uri="{BB962C8B-B14F-4D97-AF65-F5344CB8AC3E}">
+        <p14:creationId xmlns:p14="http://schemas.microsoft.com/office/powerpoint/2010/main" val="3182256782"/>
+      </p:ext>
+    </p:extLst>
+  </p:cSld>
+  <p:clrMapOvr>
+    <a:masterClrMapping/>
+  </p:clrMapOvr>
+</p:sld>
+</file>
+
+<file path=ppt/slides/slide40.xml><?xml version="1.0" encoding="utf-8"?>
+<p:sld xmlns:a="http://schemas.openxmlformats.org/drawingml/2006/main" xmlns:r="http://schemas.openxmlformats.org/officeDocument/2006/relationships" xmlns:p="http://schemas.openxmlformats.org/presentationml/2006/main">
+  <p:cSld>
+    <p:spTree>
+      <p:nvGrpSpPr>
+        <p:cNvPr id="1" name=""/>
+        <p:cNvGrpSpPr/>
+        <p:nvPr/>
+      </p:nvGrpSpPr>
+      <p:grpSpPr>
+        <a:xfrm>
+          <a:off x="0" y="0"/>
+          <a:ext cx="0" cy="0"/>
+          <a:chOff x="0" y="0"/>
+          <a:chExt cx="0" cy="0"/>
+        </a:xfrm>
+      </p:grpSpPr>
+      <p:pic>
+        <p:nvPicPr>
+          <p:cNvPr id="2" name="Picture 1"/>
+          <p:cNvPicPr>
+            <a:picLocks noChangeAspect="1"/>
+          </p:cNvPicPr>
+          <p:nvPr/>
+        </p:nvPicPr>
+        <p:blipFill>
+          <a:blip r:embed="rId2"/>
+          <a:stretch>
+            <a:fillRect/>
+          </a:stretch>
+        </p:blipFill>
+        <p:spPr>
+          <a:xfrm>
+            <a:off x="-409575" y="-228600"/>
+            <a:ext cx="13011150" cy="7315200"/>
+          </a:xfrm>
+          <a:prstGeom prst="rect">
+            <a:avLst/>
+          </a:prstGeom>
+        </p:spPr>
+      </p:pic>
+    </p:spTree>
+    <p:extLst>
+      <p:ext uri="{BB962C8B-B14F-4D97-AF65-F5344CB8AC3E}">
+        <p14:creationId xmlns:p14="http://schemas.microsoft.com/office/powerpoint/2010/main" val="1617507085"/>
+      </p:ext>
+    </p:extLst>
+  </p:cSld>
+  <p:clrMapOvr>
+    <a:masterClrMapping/>
+  </p:clrMapOvr>
+</p:sld>
+</file>
+
+<file path=ppt/slides/slide41.xml><?xml version="1.0" encoding="utf-8"?>
+<p:sld xmlns:a="http://schemas.openxmlformats.org/drawingml/2006/main" xmlns:r="http://schemas.openxmlformats.org/officeDocument/2006/relationships" xmlns:p="http://schemas.openxmlformats.org/presentationml/2006/main">
+  <p:cSld>
+    <p:spTree>
+      <p:nvGrpSpPr>
+        <p:cNvPr id="1" name=""/>
+        <p:cNvGrpSpPr/>
+        <p:nvPr/>
+      </p:nvGrpSpPr>
+      <p:grpSpPr>
+        <a:xfrm>
+          <a:off x="0" y="0"/>
+          <a:ext cx="0" cy="0"/>
+          <a:chOff x="0" y="0"/>
+          <a:chExt cx="0" cy="0"/>
+        </a:xfrm>
+      </p:grpSpPr>
+      <p:pic>
+        <p:nvPicPr>
+          <p:cNvPr id="2" name="Picture 1"/>
+          <p:cNvPicPr>
+            <a:picLocks noChangeAspect="1"/>
+          </p:cNvPicPr>
+          <p:nvPr/>
+        </p:nvPicPr>
+        <p:blipFill>
+          <a:blip r:embed="rId2"/>
+          <a:stretch>
+            <a:fillRect/>
+          </a:stretch>
+        </p:blipFill>
+        <p:spPr>
+          <a:xfrm>
+            <a:off x="-409575" y="-228600"/>
+            <a:ext cx="13011150" cy="7315200"/>
+          </a:xfrm>
+          <a:prstGeom prst="rect">
+            <a:avLst/>
+          </a:prstGeom>
+        </p:spPr>
+      </p:pic>
+    </p:spTree>
+    <p:extLst>
+      <p:ext uri="{BB962C8B-B14F-4D97-AF65-F5344CB8AC3E}">
+        <p14:creationId xmlns:p14="http://schemas.microsoft.com/office/powerpoint/2010/main" val="2158967364"/>
+      </p:ext>
+    </p:extLst>
+  </p:cSld>
+  <p:clrMapOvr>
+    <a:masterClrMapping/>
+  </p:clrMapOvr>
+</p:sld>
+</file>
+
+<file path=ppt/slides/slide42.xml><?xml version="1.0" encoding="utf-8"?>
+<p:sld xmlns:a="http://schemas.openxmlformats.org/drawingml/2006/main" xmlns:r="http://schemas.openxmlformats.org/officeDocument/2006/relationships" xmlns:p="http://schemas.openxmlformats.org/presentationml/2006/main">
+  <p:cSld>
+    <p:spTree>
+      <p:nvGrpSpPr>
+        <p:cNvPr id="1" name=""/>
+        <p:cNvGrpSpPr/>
+        <p:nvPr/>
+      </p:nvGrpSpPr>
+      <p:grpSpPr>
+        <a:xfrm>
+          <a:off x="0" y="0"/>
+          <a:ext cx="0" cy="0"/>
+          <a:chOff x="0" y="0"/>
+          <a:chExt cx="0" cy="0"/>
+        </a:xfrm>
+      </p:grpSpPr>
+      <p:pic>
+        <p:nvPicPr>
+          <p:cNvPr id="2" name="Picture 1"/>
+          <p:cNvPicPr>
+            <a:picLocks noChangeAspect="1"/>
+          </p:cNvPicPr>
+          <p:nvPr/>
+        </p:nvPicPr>
+        <p:blipFill>
+          <a:blip r:embed="rId2"/>
+          <a:stretch>
+            <a:fillRect/>
+          </a:stretch>
+        </p:blipFill>
+        <p:spPr>
+          <a:xfrm>
+            <a:off x="-409575" y="-228600"/>
+            <a:ext cx="13011150" cy="7315200"/>
+          </a:xfrm>
+          <a:prstGeom prst="rect">
+            <a:avLst/>
+          </a:prstGeom>
+        </p:spPr>
+      </p:pic>
+    </p:spTree>
+    <p:extLst>
+      <p:ext uri="{BB962C8B-B14F-4D97-AF65-F5344CB8AC3E}">
+        <p14:creationId xmlns:p14="http://schemas.microsoft.com/office/powerpoint/2010/main" val="3112977915"/>
+      </p:ext>
+    </p:extLst>
+  </p:cSld>
+  <p:clrMapOvr>
+    <a:masterClrMapping/>
+  </p:clrMapOvr>
+</p:sld>
+</file>
+
+<file path=ppt/slides/slide43.xml><?xml version="1.0" encoding="utf-8"?>
+<p:sld xmlns:a="http://schemas.openxmlformats.org/drawingml/2006/main" xmlns:r="http://schemas.openxmlformats.org/officeDocument/2006/relationships" xmlns:p="http://schemas.openxmlformats.org/presentationml/2006/main">
+  <p:cSld>
+    <p:spTree>
+      <p:nvGrpSpPr>
+        <p:cNvPr id="1" name=""/>
+        <p:cNvGrpSpPr/>
+        <p:nvPr/>
+      </p:nvGrpSpPr>
+      <p:grpSpPr>
+        <a:xfrm>
+          <a:off x="0" y="0"/>
+          <a:ext cx="0" cy="0"/>
+          <a:chOff x="0" y="0"/>
+          <a:chExt cx="0" cy="0"/>
+        </a:xfrm>
+      </p:grpSpPr>
+      <p:pic>
+        <p:nvPicPr>
+          <p:cNvPr id="2" name="Picture 1"/>
+          <p:cNvPicPr>
+            <a:picLocks noChangeAspect="1"/>
+          </p:cNvPicPr>
+          <p:nvPr/>
+        </p:nvPicPr>
+        <p:blipFill>
+          <a:blip r:embed="rId2"/>
+          <a:stretch>
+            <a:fillRect/>
+          </a:stretch>
+        </p:blipFill>
+        <p:spPr>
+          <a:xfrm>
+            <a:off x="-409575" y="-228600"/>
+            <a:ext cx="13011150" cy="7315200"/>
+          </a:xfrm>
+          <a:prstGeom prst="rect">
+            <a:avLst/>
+          </a:prstGeom>
+        </p:spPr>
+      </p:pic>
+    </p:spTree>
+    <p:extLst>
+      <p:ext uri="{BB962C8B-B14F-4D97-AF65-F5344CB8AC3E}">
+        <p14:creationId xmlns:p14="http://schemas.microsoft.com/office/powerpoint/2010/main" val="2220898171"/>
+      </p:ext>
+    </p:extLst>
+  </p:cSld>
+  <p:clrMapOvr>
+    <a:masterClrMapping/>
+  </p:clrMapOvr>
+</p:sld>
+</file>
+
+<file path=ppt/slides/slide44.xml><?xml version="1.0" encoding="utf-8"?>
+<p:sld xmlns:a="http://schemas.openxmlformats.org/drawingml/2006/main" xmlns:r="http://schemas.openxmlformats.org/officeDocument/2006/relationships" xmlns:p="http://schemas.openxmlformats.org/presentationml/2006/main">
+  <p:cSld>
+    <p:spTree>
+      <p:nvGrpSpPr>
+        <p:cNvPr id="1" name=""/>
+        <p:cNvGrpSpPr/>
+        <p:nvPr/>
+      </p:nvGrpSpPr>
+      <p:grpSpPr>
+        <a:xfrm>
+          <a:off x="0" y="0"/>
+          <a:ext cx="0" cy="0"/>
+          <a:chOff x="0" y="0"/>
+          <a:chExt cx="0" cy="0"/>
+        </a:xfrm>
+      </p:grpSpPr>
+      <p:pic>
+        <p:nvPicPr>
+          <p:cNvPr id="2" name="Picture 1"/>
+          <p:cNvPicPr>
+            <a:picLocks noChangeAspect="1"/>
+          </p:cNvPicPr>
+          <p:nvPr/>
+        </p:nvPicPr>
+        <p:blipFill>
+          <a:blip r:embed="rId2"/>
+          <a:stretch>
+            <a:fillRect/>
+          </a:stretch>
+        </p:blipFill>
+        <p:spPr>
+          <a:xfrm>
+            <a:off x="-409575" y="-228600"/>
+            <a:ext cx="13011150" cy="7315200"/>
+          </a:xfrm>
+          <a:prstGeom prst="rect">
+            <a:avLst/>
+          </a:prstGeom>
+        </p:spPr>
+      </p:pic>
+    </p:spTree>
+    <p:extLst>
+      <p:ext uri="{BB962C8B-B14F-4D97-AF65-F5344CB8AC3E}">
+        <p14:creationId xmlns:p14="http://schemas.microsoft.com/office/powerpoint/2010/main" val="378038362"/>
+      </p:ext>
+    </p:extLst>
+  </p:cSld>
+  <p:clrMapOvr>
+    <a:masterClrMapping/>
+  </p:clrMapOvr>
+</p:sld>
+</file>
+
+<file path=ppt/slides/slide45.xml><?xml version="1.0" encoding="utf-8"?>
+<p:sld xmlns:a="http://schemas.openxmlformats.org/drawingml/2006/main" xmlns:r="http://schemas.openxmlformats.org/officeDocument/2006/relationships" xmlns:p="http://schemas.openxmlformats.org/presentationml/2006/main">
+  <p:cSld>
+    <p:spTree>
+      <p:nvGrpSpPr>
+        <p:cNvPr id="1" name=""/>
+        <p:cNvGrpSpPr/>
+        <p:nvPr/>
+      </p:nvGrpSpPr>
+      <p:grpSpPr>
+        <a:xfrm>
+          <a:off x="0" y="0"/>
+          <a:ext cx="0" cy="0"/>
+          <a:chOff x="0" y="0"/>
+          <a:chExt cx="0" cy="0"/>
+        </a:xfrm>
+      </p:grpSpPr>
+      <p:pic>
+        <p:nvPicPr>
+          <p:cNvPr id="2" name="Picture 1"/>
+          <p:cNvPicPr>
+            <a:picLocks noChangeAspect="1"/>
+          </p:cNvPicPr>
+          <p:nvPr/>
+        </p:nvPicPr>
+        <p:blipFill>
+          <a:blip r:embed="rId2"/>
+          <a:stretch>
+            <a:fillRect/>
+          </a:stretch>
+        </p:blipFill>
+        <p:spPr>
+          <a:xfrm>
+            <a:off x="-409575" y="-228600"/>
+            <a:ext cx="13011150" cy="7315200"/>
+          </a:xfrm>
+          <a:prstGeom prst="rect">
+            <a:avLst/>
+          </a:prstGeom>
+        </p:spPr>
+      </p:pic>
+    </p:spTree>
+    <p:extLst>
+      <p:ext uri="{BB962C8B-B14F-4D97-AF65-F5344CB8AC3E}">
+        <p14:creationId xmlns:p14="http://schemas.microsoft.com/office/powerpoint/2010/main" val="2731932615"/>
+      </p:ext>
+    </p:extLst>
+  </p:cSld>
+  <p:clrMapOvr>
+    <a:masterClrMapping/>
+  </p:clrMapOvr>
+</p:sld>
+</file>
+
+<file path=ppt/slides/slide46.xml><?xml version="1.0" encoding="utf-8"?>
+<p:sld xmlns:a="http://schemas.openxmlformats.org/drawingml/2006/main" xmlns:r="http://schemas.openxmlformats.org/officeDocument/2006/relationships" xmlns:p="http://schemas.openxmlformats.org/presentationml/2006/main">
+  <p:cSld>
+    <p:spTree>
+      <p:nvGrpSpPr>
+        <p:cNvPr id="1" name=""/>
+        <p:cNvGrpSpPr/>
+        <p:nvPr/>
+      </p:nvGrpSpPr>
+      <p:grpSpPr>
+        <a:xfrm>
+          <a:off x="0" y="0"/>
+          <a:ext cx="0" cy="0"/>
+          <a:chOff x="0" y="0"/>
+          <a:chExt cx="0" cy="0"/>
+        </a:xfrm>
+      </p:grpSpPr>
+      <p:pic>
+        <p:nvPicPr>
+          <p:cNvPr id="2" name="Picture 1"/>
+          <p:cNvPicPr>
+            <a:picLocks noChangeAspect="1"/>
+          </p:cNvPicPr>
+          <p:nvPr/>
+        </p:nvPicPr>
+        <p:blipFill>
+          <a:blip r:embed="rId2"/>
+          <a:stretch>
+            <a:fillRect/>
+          </a:stretch>
+        </p:blipFill>
+        <p:spPr>
+          <a:xfrm>
+            <a:off x="-409575" y="-228600"/>
+            <a:ext cx="13011150" cy="7315200"/>
+          </a:xfrm>
+          <a:prstGeom prst="rect">
+            <a:avLst/>
+          </a:prstGeom>
+        </p:spPr>
+      </p:pic>
+    </p:spTree>
+    <p:extLst>
+      <p:ext uri="{BB962C8B-B14F-4D97-AF65-F5344CB8AC3E}">
+        <p14:creationId xmlns:p14="http://schemas.microsoft.com/office/powerpoint/2010/main" val="1076255003"/>
+      </p:ext>
+    </p:extLst>
+  </p:cSld>
+  <p:clrMapOvr>
+    <a:masterClrMapping/>
+  </p:clrMapOvr>
+</p:sld>
+</file>
+
+<file path=ppt/slides/slide47.xml><?xml version="1.0" encoding="utf-8"?>
+<p:sld xmlns:a="http://schemas.openxmlformats.org/drawingml/2006/main" xmlns:r="http://schemas.openxmlformats.org/officeDocument/2006/relationships" xmlns:p="http://schemas.openxmlformats.org/presentationml/2006/main">
+  <p:cSld>
+    <p:spTree>
+      <p:nvGrpSpPr>
+        <p:cNvPr id="1" name=""/>
+        <p:cNvGrpSpPr/>
+        <p:nvPr/>
+      </p:nvGrpSpPr>
+      <p:grpSpPr>
+        <a:xfrm>
+          <a:off x="0" y="0"/>
+          <a:ext cx="0" cy="0"/>
+          <a:chOff x="0" y="0"/>
+          <a:chExt cx="0" cy="0"/>
+        </a:xfrm>
+      </p:grpSpPr>
+      <p:pic>
+        <p:nvPicPr>
+          <p:cNvPr id="2" name="Picture 1"/>
+          <p:cNvPicPr>
+            <a:picLocks noChangeAspect="1"/>
+          </p:cNvPicPr>
+          <p:nvPr/>
+        </p:nvPicPr>
+        <p:blipFill>
+          <a:blip r:embed="rId2"/>
+          <a:stretch>
+            <a:fillRect/>
+          </a:stretch>
+        </p:blipFill>
+        <p:spPr>
+          <a:xfrm>
+            <a:off x="-409575" y="-228600"/>
+            <a:ext cx="13011150" cy="7315200"/>
+          </a:xfrm>
+          <a:prstGeom prst="rect">
+            <a:avLst/>
+          </a:prstGeom>
+        </p:spPr>
+      </p:pic>
+    </p:spTree>
+    <p:extLst>
+      <p:ext uri="{BB962C8B-B14F-4D97-AF65-F5344CB8AC3E}">
+        <p14:creationId xmlns:p14="http://schemas.microsoft.com/office/powerpoint/2010/main" val="45854039"/>
+      </p:ext>
+    </p:extLst>
+  </p:cSld>
+  <p:clrMapOvr>
+    <a:masterClrMapping/>
+  </p:clrMapOvr>
+</p:sld>
+</file>
+
+<file path=ppt/slides/slide48.xml><?xml version="1.0" encoding="utf-8"?>
+<p:sld xmlns:a="http://schemas.openxmlformats.org/drawingml/2006/main" xmlns:r="http://schemas.openxmlformats.org/officeDocument/2006/relationships" xmlns:p="http://schemas.openxmlformats.org/presentationml/2006/main">
+  <p:cSld>
+    <p:spTree>
+      <p:nvGrpSpPr>
+        <p:cNvPr id="1" name=""/>
+        <p:cNvGrpSpPr/>
+        <p:nvPr/>
+      </p:nvGrpSpPr>
+      <p:grpSpPr>
+        <a:xfrm>
+          <a:off x="0" y="0"/>
+          <a:ext cx="0" cy="0"/>
+          <a:chOff x="0" y="0"/>
+          <a:chExt cx="0" cy="0"/>
+        </a:xfrm>
+      </p:grpSpPr>
+      <p:pic>
+        <p:nvPicPr>
+          <p:cNvPr id="2" name="Picture 1"/>
+          <p:cNvPicPr>
+            <a:picLocks noChangeAspect="1"/>
+          </p:cNvPicPr>
+          <p:nvPr/>
+        </p:nvPicPr>
+        <p:blipFill>
+          <a:blip r:embed="rId2"/>
+          <a:stretch>
+            <a:fillRect/>
+          </a:stretch>
+        </p:blipFill>
+        <p:spPr>
+          <a:xfrm>
+            <a:off x="-409575" y="-228600"/>
+            <a:ext cx="13011150" cy="7315200"/>
+          </a:xfrm>
+          <a:prstGeom prst="rect">
+            <a:avLst/>
+          </a:prstGeom>
+        </p:spPr>
+      </p:pic>
+    </p:spTree>
+    <p:extLst>
+      <p:ext uri="{BB962C8B-B14F-4D97-AF65-F5344CB8AC3E}">
+        <p14:creationId xmlns:p14="http://schemas.microsoft.com/office/powerpoint/2010/main" val="2094895447"/>
+      </p:ext>
+    </p:extLst>
+  </p:cSld>
+  <p:clrMapOvr>
+    <a:masterClrMapping/>
+  </p:clrMapOvr>
+</p:sld>
+</file>
+
+<file path=ppt/slides/slide49.xml><?xml version="1.0" encoding="utf-8"?>
+<p:sld xmlns:a="http://schemas.openxmlformats.org/drawingml/2006/main" xmlns:r="http://schemas.openxmlformats.org/officeDocument/2006/relationships" xmlns:p="http://schemas.openxmlformats.org/presentationml/2006/main">
+  <p:cSld>
+    <p:spTree>
+      <p:nvGrpSpPr>
+        <p:cNvPr id="1" name=""/>
+        <p:cNvGrpSpPr/>
+        <p:nvPr/>
+      </p:nvGrpSpPr>
+      <p:grpSpPr>
+        <a:xfrm>
+          <a:off x="0" y="0"/>
+          <a:ext cx="0" cy="0"/>
+          <a:chOff x="0" y="0"/>
+          <a:chExt cx="0" cy="0"/>
+        </a:xfrm>
+      </p:grpSpPr>
+      <p:pic>
+        <p:nvPicPr>
+          <p:cNvPr id="2" name="Picture 1"/>
+          <p:cNvPicPr>
+            <a:picLocks noChangeAspect="1"/>
+          </p:cNvPicPr>
+          <p:nvPr/>
+        </p:nvPicPr>
+        <p:blipFill>
+          <a:blip r:embed="rId2"/>
+          <a:stretch>
+            <a:fillRect/>
+          </a:stretch>
+        </p:blipFill>
+        <p:spPr>
+          <a:xfrm>
+            <a:off x="-409575" y="-228600"/>
+            <a:ext cx="13011150" cy="7315200"/>
+          </a:xfrm>
+          <a:prstGeom prst="rect">
+            <a:avLst/>
+          </a:prstGeom>
+        </p:spPr>
+      </p:pic>
+    </p:spTree>
+    <p:extLst>
+      <p:ext uri="{BB962C8B-B14F-4D97-AF65-F5344CB8AC3E}">
+        <p14:creationId xmlns:p14="http://schemas.microsoft.com/office/powerpoint/2010/main" val="572378629"/>
+      </p:ext>
+    </p:extLst>
+  </p:cSld>
+  <p:clrMapOvr>
+    <a:masterClrMapping/>
+  </p:clrMapOvr>
+</p:sld>
+</file>
+
+<file path=ppt/slides/slide5.xml><?xml version="1.0" encoding="utf-8"?>
+<p:sld xmlns:a="http://schemas.openxmlformats.org/drawingml/2006/main" xmlns:r="http://schemas.openxmlformats.org/officeDocument/2006/relationships" xmlns:p="http://schemas.openxmlformats.org/presentationml/2006/main">
+  <p:cSld>
+    <p:spTree>
+      <p:nvGrpSpPr>
+        <p:cNvPr id="1" name=""/>
+        <p:cNvGrpSpPr/>
+        <p:nvPr/>
+      </p:nvGrpSpPr>
+      <p:grpSpPr>
+        <a:xfrm>
+          <a:off x="0" y="0"/>
+          <a:ext cx="0" cy="0"/>
+          <a:chOff x="0" y="0"/>
+          <a:chExt cx="0" cy="0"/>
+        </a:xfrm>
+      </p:grpSpPr>
+      <p:pic>
+        <p:nvPicPr>
+          <p:cNvPr id="2" name="Picture 1"/>
+          <p:cNvPicPr>
+            <a:picLocks noChangeAspect="1"/>
+          </p:cNvPicPr>
+          <p:nvPr/>
+        </p:nvPicPr>
+        <p:blipFill>
+          <a:blip r:embed="rId2"/>
+          <a:stretch>
+            <a:fillRect/>
+          </a:stretch>
+        </p:blipFill>
+        <p:spPr>
+          <a:xfrm>
+            <a:off x="-409575" y="-228600"/>
+            <a:ext cx="13011150" cy="7315200"/>
+          </a:xfrm>
+          <a:prstGeom prst="rect">
+            <a:avLst/>
+          </a:prstGeom>
+        </p:spPr>
+      </p:pic>
+    </p:spTree>
+    <p:extLst>
+      <p:ext uri="{BB962C8B-B14F-4D97-AF65-F5344CB8AC3E}">
         <p14:creationId xmlns:p14="http://schemas.microsoft.com/office/powerpoint/2010/main" val="2956692437"/>
+      </p:ext>
+    </p:extLst>
+  </p:cSld>
+  <p:clrMapOvr>
+    <a:masterClrMapping/>
+  </p:clrMapOvr>
+</p:sld>
+</file>
+
+<file path=ppt/slides/slide50.xml><?xml version="1.0" encoding="utf-8"?>
+<p:sld xmlns:a="http://schemas.openxmlformats.org/drawingml/2006/main" xmlns:r="http://schemas.openxmlformats.org/officeDocument/2006/relationships" xmlns:p="http://schemas.openxmlformats.org/presentationml/2006/main">
+  <p:cSld>
+    <p:spTree>
+      <p:nvGrpSpPr>
+        <p:cNvPr id="1" name=""/>
+        <p:cNvGrpSpPr/>
+        <p:nvPr/>
+      </p:nvGrpSpPr>
+      <p:grpSpPr>
+        <a:xfrm>
+          <a:off x="0" y="0"/>
+          <a:ext cx="0" cy="0"/>
+          <a:chOff x="0" y="0"/>
+          <a:chExt cx="0" cy="0"/>
+        </a:xfrm>
+      </p:grpSpPr>
+      <p:pic>
+        <p:nvPicPr>
+          <p:cNvPr id="2" name="Picture 1"/>
+          <p:cNvPicPr>
+            <a:picLocks noChangeAspect="1"/>
+          </p:cNvPicPr>
+          <p:nvPr/>
+        </p:nvPicPr>
+        <p:blipFill>
+          <a:blip r:embed="rId2"/>
+          <a:stretch>
+            <a:fillRect/>
+          </a:stretch>
+        </p:blipFill>
+        <p:spPr>
+          <a:xfrm>
+            <a:off x="-409575" y="-228600"/>
+            <a:ext cx="13011150" cy="7315200"/>
+          </a:xfrm>
+          <a:prstGeom prst="rect">
+            <a:avLst/>
+          </a:prstGeom>
+        </p:spPr>
+      </p:pic>
+    </p:spTree>
+    <p:extLst>
+      <p:ext uri="{BB962C8B-B14F-4D97-AF65-F5344CB8AC3E}">
+        <p14:creationId xmlns:p14="http://schemas.microsoft.com/office/powerpoint/2010/main" val="4254527900"/>
+      </p:ext>
+    </p:extLst>
+  </p:cSld>
+  <p:clrMapOvr>
+    <a:masterClrMapping/>
+  </p:clrMapOvr>
+</p:sld>
+</file>
+
+<file path=ppt/slides/slide51.xml><?xml version="1.0" encoding="utf-8"?>
+<p:sld xmlns:a="http://schemas.openxmlformats.org/drawingml/2006/main" xmlns:r="http://schemas.openxmlformats.org/officeDocument/2006/relationships" xmlns:p="http://schemas.openxmlformats.org/presentationml/2006/main">
+  <p:cSld>
+    <p:spTree>
+      <p:nvGrpSpPr>
+        <p:cNvPr id="1" name=""/>
+        <p:cNvGrpSpPr/>
+        <p:nvPr/>
+      </p:nvGrpSpPr>
+      <p:grpSpPr>
+        <a:xfrm>
+          <a:off x="0" y="0"/>
+          <a:ext cx="0" cy="0"/>
+          <a:chOff x="0" y="0"/>
+          <a:chExt cx="0" cy="0"/>
+        </a:xfrm>
+      </p:grpSpPr>
+      <p:pic>
+        <p:nvPicPr>
+          <p:cNvPr id="2" name="Picture 1"/>
+          <p:cNvPicPr>
+            <a:picLocks noChangeAspect="1"/>
+          </p:cNvPicPr>
+          <p:nvPr/>
+        </p:nvPicPr>
+        <p:blipFill>
+          <a:blip r:embed="rId2"/>
+          <a:stretch>
+            <a:fillRect/>
+          </a:stretch>
+        </p:blipFill>
+        <p:spPr>
+          <a:xfrm>
+            <a:off x="-409575" y="-228600"/>
+            <a:ext cx="13011150" cy="7315200"/>
+          </a:xfrm>
+          <a:prstGeom prst="rect">
+            <a:avLst/>
+          </a:prstGeom>
+        </p:spPr>
+      </p:pic>
+    </p:spTree>
+    <p:extLst>
+      <p:ext uri="{BB962C8B-B14F-4D97-AF65-F5344CB8AC3E}">
+        <p14:creationId xmlns:p14="http://schemas.microsoft.com/office/powerpoint/2010/main" val="1737270970"/>
+      </p:ext>
+    </p:extLst>
+  </p:cSld>
+  <p:clrMapOvr>
+    <a:masterClrMapping/>
+  </p:clrMapOvr>
+</p:sld>
+</file>
+
+<file path=ppt/slides/slide52.xml><?xml version="1.0" encoding="utf-8"?>
+<p:sld xmlns:a="http://schemas.openxmlformats.org/drawingml/2006/main" xmlns:r="http://schemas.openxmlformats.org/officeDocument/2006/relationships" xmlns:p="http://schemas.openxmlformats.org/presentationml/2006/main">
+  <p:cSld>
+    <p:spTree>
+      <p:nvGrpSpPr>
+        <p:cNvPr id="1" name=""/>
+        <p:cNvGrpSpPr/>
+        <p:nvPr/>
+      </p:nvGrpSpPr>
+      <p:grpSpPr>
+        <a:xfrm>
+          <a:off x="0" y="0"/>
+          <a:ext cx="0" cy="0"/>
+          <a:chOff x="0" y="0"/>
+          <a:chExt cx="0" cy="0"/>
+        </a:xfrm>
+      </p:grpSpPr>
+      <p:pic>
+        <p:nvPicPr>
+          <p:cNvPr id="2" name="Picture 1"/>
+          <p:cNvPicPr>
+            <a:picLocks noChangeAspect="1"/>
+          </p:cNvPicPr>
+          <p:nvPr/>
+        </p:nvPicPr>
+        <p:blipFill>
+          <a:blip r:embed="rId2"/>
+          <a:stretch>
+            <a:fillRect/>
+          </a:stretch>
+        </p:blipFill>
+        <p:spPr>
+          <a:xfrm>
+            <a:off x="-409575" y="-228600"/>
+            <a:ext cx="13011150" cy="7315200"/>
+          </a:xfrm>
+          <a:prstGeom prst="rect">
+            <a:avLst/>
+          </a:prstGeom>
+        </p:spPr>
+      </p:pic>
+    </p:spTree>
+    <p:extLst>
+      <p:ext uri="{BB962C8B-B14F-4D97-AF65-F5344CB8AC3E}">
+        <p14:creationId xmlns:p14="http://schemas.microsoft.com/office/powerpoint/2010/main" val="3876400753"/>
+      </p:ext>
+    </p:extLst>
+  </p:cSld>
+  <p:clrMapOvr>
+    <a:masterClrMapping/>
+  </p:clrMapOvr>
+</p:sld>
+</file>
+
+<file path=ppt/slides/slide53.xml><?xml version="1.0" encoding="utf-8"?>
+<p:sld xmlns:a="http://schemas.openxmlformats.org/drawingml/2006/main" xmlns:r="http://schemas.openxmlformats.org/officeDocument/2006/relationships" xmlns:p="http://schemas.openxmlformats.org/presentationml/2006/main">
+  <p:cSld>
+    <p:spTree>
+      <p:nvGrpSpPr>
+        <p:cNvPr id="1" name=""/>
+        <p:cNvGrpSpPr/>
+        <p:nvPr/>
+      </p:nvGrpSpPr>
+      <p:grpSpPr>
+        <a:xfrm>
+          <a:off x="0" y="0"/>
+          <a:ext cx="0" cy="0"/>
+          <a:chOff x="0" y="0"/>
+          <a:chExt cx="0" cy="0"/>
+        </a:xfrm>
+      </p:grpSpPr>
+      <p:pic>
+        <p:nvPicPr>
+          <p:cNvPr id="2" name="Picture 1"/>
+          <p:cNvPicPr>
+            <a:picLocks noChangeAspect="1"/>
+          </p:cNvPicPr>
+          <p:nvPr/>
+        </p:nvPicPr>
+        <p:blipFill>
+          <a:blip r:embed="rId2"/>
+          <a:stretch>
+            <a:fillRect/>
+          </a:stretch>
+        </p:blipFill>
+        <p:spPr>
+          <a:xfrm>
+            <a:off x="-409575" y="-228600"/>
+            <a:ext cx="13011150" cy="7315200"/>
+          </a:xfrm>
+          <a:prstGeom prst="rect">
+            <a:avLst/>
+          </a:prstGeom>
+        </p:spPr>
+      </p:pic>
+    </p:spTree>
+    <p:extLst>
+      <p:ext uri="{BB962C8B-B14F-4D97-AF65-F5344CB8AC3E}">
+        <p14:creationId xmlns:p14="http://schemas.microsoft.com/office/powerpoint/2010/main" val="1663219026"/>
+      </p:ext>
+    </p:extLst>
+  </p:cSld>
+  <p:clrMapOvr>
+    <a:masterClrMapping/>
+  </p:clrMapOvr>
+</p:sld>
+</file>
+
+<file path=ppt/slides/slide54.xml><?xml version="1.0" encoding="utf-8"?>
+<p:sld xmlns:a="http://schemas.openxmlformats.org/drawingml/2006/main" xmlns:r="http://schemas.openxmlformats.org/officeDocument/2006/relationships" xmlns:p="http://schemas.openxmlformats.org/presentationml/2006/main">
+  <p:cSld>
+    <p:spTree>
+      <p:nvGrpSpPr>
+        <p:cNvPr id="1" name=""/>
+        <p:cNvGrpSpPr/>
+        <p:nvPr/>
+      </p:nvGrpSpPr>
+      <p:grpSpPr>
+        <a:xfrm>
+          <a:off x="0" y="0"/>
+          <a:ext cx="0" cy="0"/>
+          <a:chOff x="0" y="0"/>
+          <a:chExt cx="0" cy="0"/>
+        </a:xfrm>
+      </p:grpSpPr>
+      <p:pic>
+        <p:nvPicPr>
+          <p:cNvPr id="2" name="Picture 1"/>
+          <p:cNvPicPr>
+            <a:picLocks noChangeAspect="1"/>
+          </p:cNvPicPr>
+          <p:nvPr/>
+        </p:nvPicPr>
+        <p:blipFill>
+          <a:blip r:embed="rId2"/>
+          <a:stretch>
+            <a:fillRect/>
+          </a:stretch>
+        </p:blipFill>
+        <p:spPr>
+          <a:xfrm>
+            <a:off x="-409575" y="-228600"/>
+            <a:ext cx="13011150" cy="7315200"/>
+          </a:xfrm>
+          <a:prstGeom prst="rect">
+            <a:avLst/>
+          </a:prstGeom>
+        </p:spPr>
+      </p:pic>
+    </p:spTree>
+    <p:extLst>
+      <p:ext uri="{BB962C8B-B14F-4D97-AF65-F5344CB8AC3E}">
+        <p14:creationId xmlns:p14="http://schemas.microsoft.com/office/powerpoint/2010/main" val="1988979381"/>
+      </p:ext>
+    </p:extLst>
+  </p:cSld>
+  <p:clrMapOvr>
+    <a:masterClrMapping/>
+  </p:clrMapOvr>
+</p:sld>
+</file>
+
+<file path=ppt/slides/slide55.xml><?xml version="1.0" encoding="utf-8"?>
+<p:sld xmlns:a="http://schemas.openxmlformats.org/drawingml/2006/main" xmlns:r="http://schemas.openxmlformats.org/officeDocument/2006/relationships" xmlns:p="http://schemas.openxmlformats.org/presentationml/2006/main">
+  <p:cSld>
+    <p:spTree>
+      <p:nvGrpSpPr>
+        <p:cNvPr id="1" name=""/>
+        <p:cNvGrpSpPr/>
+        <p:nvPr/>
+      </p:nvGrpSpPr>
+      <p:grpSpPr>
+        <a:xfrm>
+          <a:off x="0" y="0"/>
+          <a:ext cx="0" cy="0"/>
+          <a:chOff x="0" y="0"/>
+          <a:chExt cx="0" cy="0"/>
+        </a:xfrm>
+      </p:grpSpPr>
+      <p:pic>
+        <p:nvPicPr>
+          <p:cNvPr id="2" name="Picture 1"/>
+          <p:cNvPicPr>
+            <a:picLocks noChangeAspect="1"/>
+          </p:cNvPicPr>
+          <p:nvPr/>
+        </p:nvPicPr>
+        <p:blipFill>
+          <a:blip r:embed="rId2"/>
+          <a:stretch>
+            <a:fillRect/>
+          </a:stretch>
+        </p:blipFill>
+        <p:spPr>
+          <a:xfrm>
+            <a:off x="-409575" y="-228600"/>
+            <a:ext cx="13011150" cy="7315200"/>
+          </a:xfrm>
+          <a:prstGeom prst="rect">
+            <a:avLst/>
+          </a:prstGeom>
+        </p:spPr>
+      </p:pic>
+    </p:spTree>
+    <p:extLst>
+      <p:ext uri="{BB962C8B-B14F-4D97-AF65-F5344CB8AC3E}">
+        <p14:creationId xmlns:p14="http://schemas.microsoft.com/office/powerpoint/2010/main" val="1963871652"/>
+      </p:ext>
+    </p:extLst>
+  </p:cSld>
+  <p:clrMapOvr>
+    <a:masterClrMapping/>
+  </p:clrMapOvr>
+</p:sld>
+</file>
+
+<file path=ppt/slides/slide56.xml><?xml version="1.0" encoding="utf-8"?>
+<p:sld xmlns:a="http://schemas.openxmlformats.org/drawingml/2006/main" xmlns:r="http://schemas.openxmlformats.org/officeDocument/2006/relationships" xmlns:p="http://schemas.openxmlformats.org/presentationml/2006/main">
+  <p:cSld>
+    <p:spTree>
+      <p:nvGrpSpPr>
+        <p:cNvPr id="1" name=""/>
+        <p:cNvGrpSpPr/>
+        <p:nvPr/>
+      </p:nvGrpSpPr>
+      <p:grpSpPr>
+        <a:xfrm>
+          <a:off x="0" y="0"/>
+          <a:ext cx="0" cy="0"/>
+          <a:chOff x="0" y="0"/>
+          <a:chExt cx="0" cy="0"/>
+        </a:xfrm>
+      </p:grpSpPr>
+      <p:pic>
+        <p:nvPicPr>
+          <p:cNvPr id="2" name="Picture 1"/>
+          <p:cNvPicPr>
+            <a:picLocks noChangeAspect="1"/>
+          </p:cNvPicPr>
+          <p:nvPr/>
+        </p:nvPicPr>
+        <p:blipFill>
+          <a:blip r:embed="rId2"/>
+          <a:stretch>
+            <a:fillRect/>
+          </a:stretch>
+        </p:blipFill>
+        <p:spPr>
+          <a:xfrm>
+            <a:off x="-409575" y="-228600"/>
+            <a:ext cx="13011150" cy="7315200"/>
+          </a:xfrm>
+          <a:prstGeom prst="rect">
+            <a:avLst/>
+          </a:prstGeom>
+        </p:spPr>
+      </p:pic>
+    </p:spTree>
+    <p:extLst>
+      <p:ext uri="{BB962C8B-B14F-4D97-AF65-F5344CB8AC3E}">
+        <p14:creationId xmlns:p14="http://schemas.microsoft.com/office/powerpoint/2010/main" val="4066440728"/>
+      </p:ext>
+    </p:extLst>
+  </p:cSld>
+  <p:clrMapOvr>
+    <a:masterClrMapping/>
+  </p:clrMapOvr>
+</p:sld>
+</file>
+
+<file path=ppt/slides/slide57.xml><?xml version="1.0" encoding="utf-8"?>
+<p:sld xmlns:a="http://schemas.openxmlformats.org/drawingml/2006/main" xmlns:r="http://schemas.openxmlformats.org/officeDocument/2006/relationships" xmlns:p="http://schemas.openxmlformats.org/presentationml/2006/main">
+  <p:cSld>
+    <p:spTree>
+      <p:nvGrpSpPr>
+        <p:cNvPr id="1" name=""/>
+        <p:cNvGrpSpPr/>
+        <p:nvPr/>
+      </p:nvGrpSpPr>
+      <p:grpSpPr>
+        <a:xfrm>
+          <a:off x="0" y="0"/>
+          <a:ext cx="0" cy="0"/>
+          <a:chOff x="0" y="0"/>
+          <a:chExt cx="0" cy="0"/>
+        </a:xfrm>
+      </p:grpSpPr>
+      <p:pic>
+        <p:nvPicPr>
+          <p:cNvPr id="2" name="Picture 1"/>
+          <p:cNvPicPr>
+            <a:picLocks noChangeAspect="1"/>
+          </p:cNvPicPr>
+          <p:nvPr/>
+        </p:nvPicPr>
+        <p:blipFill>
+          <a:blip r:embed="rId2"/>
+          <a:stretch>
+            <a:fillRect/>
+          </a:stretch>
+        </p:blipFill>
+        <p:spPr>
+          <a:xfrm>
+            <a:off x="-409575" y="-228600"/>
+            <a:ext cx="13011150" cy="7315200"/>
+          </a:xfrm>
+          <a:prstGeom prst="rect">
+            <a:avLst/>
+          </a:prstGeom>
+        </p:spPr>
+      </p:pic>
+    </p:spTree>
+    <p:extLst>
+      <p:ext uri="{BB962C8B-B14F-4D97-AF65-F5344CB8AC3E}">
+        <p14:creationId xmlns:p14="http://schemas.microsoft.com/office/powerpoint/2010/main" val="4279202896"/>
+      </p:ext>
+    </p:extLst>
+  </p:cSld>
+  <p:clrMapOvr>
+    <a:masterClrMapping/>
+  </p:clrMapOvr>
+</p:sld>
+</file>
+
+<file path=ppt/slides/slide58.xml><?xml version="1.0" encoding="utf-8"?>
+<p:sld xmlns:a="http://schemas.openxmlformats.org/drawingml/2006/main" xmlns:r="http://schemas.openxmlformats.org/officeDocument/2006/relationships" xmlns:p="http://schemas.openxmlformats.org/presentationml/2006/main">
+  <p:cSld>
+    <p:spTree>
+      <p:nvGrpSpPr>
+        <p:cNvPr id="1" name=""/>
+        <p:cNvGrpSpPr/>
+        <p:nvPr/>
+      </p:nvGrpSpPr>
+      <p:grpSpPr>
+        <a:xfrm>
+          <a:off x="0" y="0"/>
+          <a:ext cx="0" cy="0"/>
+          <a:chOff x="0" y="0"/>
+          <a:chExt cx="0" cy="0"/>
+        </a:xfrm>
+      </p:grpSpPr>
+      <p:pic>
+        <p:nvPicPr>
+          <p:cNvPr id="2" name="Picture 1"/>
+          <p:cNvPicPr>
+            <a:picLocks noChangeAspect="1"/>
+          </p:cNvPicPr>
+          <p:nvPr/>
+        </p:nvPicPr>
+        <p:blipFill>
+          <a:blip r:embed="rId2"/>
+          <a:stretch>
+            <a:fillRect/>
+          </a:stretch>
+        </p:blipFill>
+        <p:spPr>
+          <a:xfrm>
+            <a:off x="-409575" y="-228600"/>
+            <a:ext cx="13011150" cy="7315200"/>
+          </a:xfrm>
+          <a:prstGeom prst="rect">
+            <a:avLst/>
+          </a:prstGeom>
+        </p:spPr>
+      </p:pic>
+    </p:spTree>
+    <p:extLst>
+      <p:ext uri="{BB962C8B-B14F-4D97-AF65-F5344CB8AC3E}">
+        <p14:creationId xmlns:p14="http://schemas.microsoft.com/office/powerpoint/2010/main" val="893008855"/>
       </p:ext>
     </p:extLst>
   </p:cSld>

</xml_diff>